<commit_message>
update Azure UA Community 2015.pptx
</commit_message>
<xml_diff>
--- a/Azure UA Community 2015.pptx
+++ b/Azure UA Community 2015.pptx
@@ -5,10 +5,10 @@
     <p:sldMasterId id="2147483713" r:id="rId2"/>
   </p:sldMasterIdLst>
   <p:notesMasterIdLst>
-    <p:notesMasterId r:id="rId10"/>
+    <p:notesMasterId r:id="rId11"/>
   </p:notesMasterIdLst>
   <p:handoutMasterIdLst>
-    <p:handoutMasterId r:id="rId11"/>
+    <p:handoutMasterId r:id="rId12"/>
   </p:handoutMasterIdLst>
   <p:sldIdLst>
     <p:sldId id="265" r:id="rId3"/>
@@ -18,11 +18,12 @@
     <p:sldId id="266" r:id="rId7"/>
     <p:sldId id="271" r:id="rId8"/>
     <p:sldId id="270" r:id="rId9"/>
+    <p:sldId id="272" r:id="rId10"/>
   </p:sldIdLst>
   <p:sldSz cx="12188825" cy="6858000"/>
   <p:notesSz cx="6858000" cy="9144000"/>
   <p:custDataLst>
-    <p:tags r:id="rId12"/>
+    <p:tags r:id="rId13"/>
   </p:custDataLst>
   <p:defaultTextStyle>
     <a:defPPr>
@@ -141,6 +142,2925 @@
 </p:presentation>
 </file>
 
+<file path=ppt/diagrams/colors1.xml><?xml version="1.0" encoding="utf-8"?>
+<dgm:colorsDef xmlns:dgm="http://schemas.openxmlformats.org/drawingml/2006/diagram" xmlns:a="http://schemas.openxmlformats.org/drawingml/2006/main" uniqueId="urn:microsoft.com/office/officeart/2005/8/colors/accent1_2">
+  <dgm:title val=""/>
+  <dgm:desc val=""/>
+  <dgm:catLst>
+    <dgm:cat type="accent1" pri="11200"/>
+  </dgm:catLst>
+  <dgm:styleLbl name="node0">
+    <dgm:fillClrLst meth="repeat">
+      <a:schemeClr val="accent1"/>
+    </dgm:fillClrLst>
+    <dgm:linClrLst meth="repeat">
+      <a:schemeClr val="lt1"/>
+    </dgm:linClrLst>
+    <dgm:effectClrLst/>
+    <dgm:txLinClrLst/>
+    <dgm:txFillClrLst/>
+    <dgm:txEffectClrLst/>
+  </dgm:styleLbl>
+  <dgm:styleLbl name="alignNode1">
+    <dgm:fillClrLst meth="repeat">
+      <a:schemeClr val="accent1"/>
+    </dgm:fillClrLst>
+    <dgm:linClrLst meth="repeat">
+      <a:schemeClr val="accent1"/>
+    </dgm:linClrLst>
+    <dgm:effectClrLst/>
+    <dgm:txLinClrLst/>
+    <dgm:txFillClrLst/>
+    <dgm:txEffectClrLst/>
+  </dgm:styleLbl>
+  <dgm:styleLbl name="node1">
+    <dgm:fillClrLst meth="repeat">
+      <a:schemeClr val="accent1"/>
+    </dgm:fillClrLst>
+    <dgm:linClrLst meth="repeat">
+      <a:schemeClr val="lt1"/>
+    </dgm:linClrLst>
+    <dgm:effectClrLst/>
+    <dgm:txLinClrLst/>
+    <dgm:txFillClrLst/>
+    <dgm:txEffectClrLst/>
+  </dgm:styleLbl>
+  <dgm:styleLbl name="lnNode1">
+    <dgm:fillClrLst meth="repeat">
+      <a:schemeClr val="accent1"/>
+    </dgm:fillClrLst>
+    <dgm:linClrLst meth="repeat">
+      <a:schemeClr val="lt1"/>
+    </dgm:linClrLst>
+    <dgm:effectClrLst/>
+    <dgm:txLinClrLst/>
+    <dgm:txFillClrLst/>
+    <dgm:txEffectClrLst/>
+  </dgm:styleLbl>
+  <dgm:styleLbl name="vennNode1">
+    <dgm:fillClrLst meth="repeat">
+      <a:schemeClr val="accent1">
+        <a:alpha val="50000"/>
+      </a:schemeClr>
+    </dgm:fillClrLst>
+    <dgm:linClrLst meth="repeat">
+      <a:schemeClr val="lt1"/>
+    </dgm:linClrLst>
+    <dgm:effectClrLst/>
+    <dgm:txLinClrLst/>
+    <dgm:txFillClrLst/>
+    <dgm:txEffectClrLst/>
+  </dgm:styleLbl>
+  <dgm:styleLbl name="node2">
+    <dgm:fillClrLst meth="repeat">
+      <a:schemeClr val="accent1"/>
+    </dgm:fillClrLst>
+    <dgm:linClrLst meth="repeat">
+      <a:schemeClr val="lt1"/>
+    </dgm:linClrLst>
+    <dgm:effectClrLst/>
+    <dgm:txLinClrLst/>
+    <dgm:txFillClrLst/>
+    <dgm:txEffectClrLst/>
+  </dgm:styleLbl>
+  <dgm:styleLbl name="node3">
+    <dgm:fillClrLst meth="repeat">
+      <a:schemeClr val="accent1"/>
+    </dgm:fillClrLst>
+    <dgm:linClrLst meth="repeat">
+      <a:schemeClr val="lt1"/>
+    </dgm:linClrLst>
+    <dgm:effectClrLst/>
+    <dgm:txLinClrLst/>
+    <dgm:txFillClrLst/>
+    <dgm:txEffectClrLst/>
+  </dgm:styleLbl>
+  <dgm:styleLbl name="node4">
+    <dgm:fillClrLst meth="repeat">
+      <a:schemeClr val="accent1"/>
+    </dgm:fillClrLst>
+    <dgm:linClrLst meth="repeat">
+      <a:schemeClr val="lt1"/>
+    </dgm:linClrLst>
+    <dgm:effectClrLst/>
+    <dgm:txLinClrLst/>
+    <dgm:txFillClrLst/>
+    <dgm:txEffectClrLst/>
+  </dgm:styleLbl>
+  <dgm:styleLbl name="fgImgPlace1">
+    <dgm:fillClrLst meth="repeat">
+      <a:schemeClr val="accent1">
+        <a:tint val="50000"/>
+      </a:schemeClr>
+    </dgm:fillClrLst>
+    <dgm:linClrLst meth="repeat">
+      <a:schemeClr val="lt1"/>
+    </dgm:linClrLst>
+    <dgm:effectClrLst/>
+    <dgm:txLinClrLst/>
+    <dgm:txFillClrLst meth="repeat">
+      <a:schemeClr val="lt1"/>
+    </dgm:txFillClrLst>
+    <dgm:txEffectClrLst/>
+  </dgm:styleLbl>
+  <dgm:styleLbl name="alignImgPlace1">
+    <dgm:fillClrLst meth="repeat">
+      <a:schemeClr val="accent1">
+        <a:tint val="50000"/>
+      </a:schemeClr>
+    </dgm:fillClrLst>
+    <dgm:linClrLst meth="repeat">
+      <a:schemeClr val="lt1"/>
+    </dgm:linClrLst>
+    <dgm:effectClrLst/>
+    <dgm:txLinClrLst/>
+    <dgm:txFillClrLst meth="repeat">
+      <a:schemeClr val="lt1"/>
+    </dgm:txFillClrLst>
+    <dgm:txEffectClrLst/>
+  </dgm:styleLbl>
+  <dgm:styleLbl name="bgImgPlace1">
+    <dgm:fillClrLst meth="repeat">
+      <a:schemeClr val="accent1">
+        <a:tint val="50000"/>
+      </a:schemeClr>
+    </dgm:fillClrLst>
+    <dgm:linClrLst meth="repeat">
+      <a:schemeClr val="lt1"/>
+    </dgm:linClrLst>
+    <dgm:effectClrLst/>
+    <dgm:txLinClrLst/>
+    <dgm:txFillClrLst meth="repeat">
+      <a:schemeClr val="lt1"/>
+    </dgm:txFillClrLst>
+    <dgm:txEffectClrLst/>
+  </dgm:styleLbl>
+  <dgm:styleLbl name="sibTrans2D1">
+    <dgm:fillClrLst meth="repeat">
+      <a:schemeClr val="accent1">
+        <a:tint val="60000"/>
+      </a:schemeClr>
+    </dgm:fillClrLst>
+    <dgm:linClrLst meth="repeat">
+      <a:schemeClr val="accent1">
+        <a:tint val="60000"/>
+      </a:schemeClr>
+    </dgm:linClrLst>
+    <dgm:effectClrLst/>
+    <dgm:txLinClrLst/>
+    <dgm:txFillClrLst/>
+    <dgm:txEffectClrLst/>
+  </dgm:styleLbl>
+  <dgm:styleLbl name="fgSibTrans2D1">
+    <dgm:fillClrLst meth="repeat">
+      <a:schemeClr val="accent1">
+        <a:tint val="60000"/>
+      </a:schemeClr>
+    </dgm:fillClrLst>
+    <dgm:linClrLst meth="repeat">
+      <a:schemeClr val="accent1">
+        <a:tint val="60000"/>
+      </a:schemeClr>
+    </dgm:linClrLst>
+    <dgm:effectClrLst/>
+    <dgm:txLinClrLst/>
+    <dgm:txFillClrLst/>
+    <dgm:txEffectClrLst/>
+  </dgm:styleLbl>
+  <dgm:styleLbl name="bgSibTrans2D1">
+    <dgm:fillClrLst meth="repeat">
+      <a:schemeClr val="accent1">
+        <a:tint val="60000"/>
+      </a:schemeClr>
+    </dgm:fillClrLst>
+    <dgm:linClrLst meth="repeat">
+      <a:schemeClr val="accent1">
+        <a:tint val="60000"/>
+      </a:schemeClr>
+    </dgm:linClrLst>
+    <dgm:effectClrLst/>
+    <dgm:txLinClrLst/>
+    <dgm:txFillClrLst/>
+    <dgm:txEffectClrLst/>
+  </dgm:styleLbl>
+  <dgm:styleLbl name="sibTrans1D1">
+    <dgm:fillClrLst meth="repeat">
+      <a:schemeClr val="accent1"/>
+    </dgm:fillClrLst>
+    <dgm:linClrLst meth="repeat">
+      <a:schemeClr val="accent1"/>
+    </dgm:linClrLst>
+    <dgm:effectClrLst/>
+    <dgm:txLinClrLst/>
+    <dgm:txFillClrLst meth="repeat">
+      <a:schemeClr val="tx1"/>
+    </dgm:txFillClrLst>
+    <dgm:txEffectClrLst/>
+  </dgm:styleLbl>
+  <dgm:styleLbl name="callout">
+    <dgm:fillClrLst meth="repeat">
+      <a:schemeClr val="accent1"/>
+    </dgm:fillClrLst>
+    <dgm:linClrLst meth="repeat">
+      <a:schemeClr val="accent1">
+        <a:tint val="50000"/>
+      </a:schemeClr>
+    </dgm:linClrLst>
+    <dgm:effectClrLst/>
+    <dgm:txLinClrLst/>
+    <dgm:txFillClrLst meth="repeat">
+      <a:schemeClr val="tx1"/>
+    </dgm:txFillClrLst>
+    <dgm:txEffectClrLst/>
+  </dgm:styleLbl>
+  <dgm:styleLbl name="asst0">
+    <dgm:fillClrLst meth="repeat">
+      <a:schemeClr val="accent1"/>
+    </dgm:fillClrLst>
+    <dgm:linClrLst meth="repeat">
+      <a:schemeClr val="lt1"/>
+    </dgm:linClrLst>
+    <dgm:effectClrLst/>
+    <dgm:txLinClrLst/>
+    <dgm:txFillClrLst/>
+    <dgm:txEffectClrLst/>
+  </dgm:styleLbl>
+  <dgm:styleLbl name="asst1">
+    <dgm:fillClrLst meth="repeat">
+      <a:schemeClr val="accent1"/>
+    </dgm:fillClrLst>
+    <dgm:linClrLst meth="repeat">
+      <a:schemeClr val="lt1"/>
+    </dgm:linClrLst>
+    <dgm:effectClrLst/>
+    <dgm:txLinClrLst/>
+    <dgm:txFillClrLst/>
+    <dgm:txEffectClrLst/>
+  </dgm:styleLbl>
+  <dgm:styleLbl name="asst2">
+    <dgm:fillClrLst meth="repeat">
+      <a:schemeClr val="accent1"/>
+    </dgm:fillClrLst>
+    <dgm:linClrLst meth="repeat">
+      <a:schemeClr val="lt1"/>
+    </dgm:linClrLst>
+    <dgm:effectClrLst/>
+    <dgm:txLinClrLst/>
+    <dgm:txFillClrLst/>
+    <dgm:txEffectClrLst/>
+  </dgm:styleLbl>
+  <dgm:styleLbl name="asst3">
+    <dgm:fillClrLst meth="repeat">
+      <a:schemeClr val="accent1"/>
+    </dgm:fillClrLst>
+    <dgm:linClrLst meth="repeat">
+      <a:schemeClr val="lt1"/>
+    </dgm:linClrLst>
+    <dgm:effectClrLst/>
+    <dgm:txLinClrLst/>
+    <dgm:txFillClrLst/>
+    <dgm:txEffectClrLst/>
+  </dgm:styleLbl>
+  <dgm:styleLbl name="asst4">
+    <dgm:fillClrLst meth="repeat">
+      <a:schemeClr val="accent1"/>
+    </dgm:fillClrLst>
+    <dgm:linClrLst meth="repeat">
+      <a:schemeClr val="lt1"/>
+    </dgm:linClrLst>
+    <dgm:effectClrLst/>
+    <dgm:txLinClrLst/>
+    <dgm:txFillClrLst/>
+    <dgm:txEffectClrLst/>
+  </dgm:styleLbl>
+  <dgm:styleLbl name="parChTrans2D1">
+    <dgm:fillClrLst meth="repeat">
+      <a:schemeClr val="accent1">
+        <a:tint val="60000"/>
+      </a:schemeClr>
+    </dgm:fillClrLst>
+    <dgm:linClrLst meth="repeat">
+      <a:schemeClr val="accent1">
+        <a:tint val="60000"/>
+      </a:schemeClr>
+    </dgm:linClrLst>
+    <dgm:effectClrLst/>
+    <dgm:txLinClrLst/>
+    <dgm:txFillClrLst meth="repeat">
+      <a:schemeClr val="lt1"/>
+    </dgm:txFillClrLst>
+    <dgm:txEffectClrLst/>
+  </dgm:styleLbl>
+  <dgm:styleLbl name="parChTrans2D2">
+    <dgm:fillClrLst meth="repeat">
+      <a:schemeClr val="accent1"/>
+    </dgm:fillClrLst>
+    <dgm:linClrLst meth="repeat">
+      <a:schemeClr val="accent1"/>
+    </dgm:linClrLst>
+    <dgm:effectClrLst/>
+    <dgm:txLinClrLst/>
+    <dgm:txFillClrLst meth="repeat">
+      <a:schemeClr val="lt1"/>
+    </dgm:txFillClrLst>
+    <dgm:txEffectClrLst/>
+  </dgm:styleLbl>
+  <dgm:styleLbl name="parChTrans2D3">
+    <dgm:fillClrLst meth="repeat">
+      <a:schemeClr val="accent1"/>
+    </dgm:fillClrLst>
+    <dgm:linClrLst meth="repeat">
+      <a:schemeClr val="accent1"/>
+    </dgm:linClrLst>
+    <dgm:effectClrLst/>
+    <dgm:txLinClrLst/>
+    <dgm:txFillClrLst meth="repeat">
+      <a:schemeClr val="lt1"/>
+    </dgm:txFillClrLst>
+    <dgm:txEffectClrLst/>
+  </dgm:styleLbl>
+  <dgm:styleLbl name="parChTrans2D4">
+    <dgm:fillClrLst meth="repeat">
+      <a:schemeClr val="accent1"/>
+    </dgm:fillClrLst>
+    <dgm:linClrLst meth="repeat">
+      <a:schemeClr val="accent1"/>
+    </dgm:linClrLst>
+    <dgm:effectClrLst/>
+    <dgm:txLinClrLst/>
+    <dgm:txFillClrLst meth="repeat">
+      <a:schemeClr val="lt1"/>
+    </dgm:txFillClrLst>
+    <dgm:txEffectClrLst/>
+  </dgm:styleLbl>
+  <dgm:styleLbl name="parChTrans1D1">
+    <dgm:fillClrLst meth="repeat">
+      <a:schemeClr val="accent1"/>
+    </dgm:fillClrLst>
+    <dgm:linClrLst meth="repeat">
+      <a:schemeClr val="accent1">
+        <a:shade val="60000"/>
+      </a:schemeClr>
+    </dgm:linClrLst>
+    <dgm:effectClrLst/>
+    <dgm:txLinClrLst/>
+    <dgm:txFillClrLst meth="repeat">
+      <a:schemeClr val="tx1"/>
+    </dgm:txFillClrLst>
+    <dgm:txEffectClrLst/>
+  </dgm:styleLbl>
+  <dgm:styleLbl name="parChTrans1D2">
+    <dgm:fillClrLst meth="repeat">
+      <a:schemeClr val="accent1"/>
+    </dgm:fillClrLst>
+    <dgm:linClrLst meth="repeat">
+      <a:schemeClr val="accent1">
+        <a:shade val="60000"/>
+      </a:schemeClr>
+    </dgm:linClrLst>
+    <dgm:effectClrLst/>
+    <dgm:txLinClrLst/>
+    <dgm:txFillClrLst meth="repeat">
+      <a:schemeClr val="tx1"/>
+    </dgm:txFillClrLst>
+    <dgm:txEffectClrLst/>
+  </dgm:styleLbl>
+  <dgm:styleLbl name="parChTrans1D3">
+    <dgm:fillClrLst meth="repeat">
+      <a:schemeClr val="accent1"/>
+    </dgm:fillClrLst>
+    <dgm:linClrLst meth="repeat">
+      <a:schemeClr val="accent1">
+        <a:shade val="80000"/>
+      </a:schemeClr>
+    </dgm:linClrLst>
+    <dgm:effectClrLst/>
+    <dgm:txLinClrLst/>
+    <dgm:txFillClrLst meth="repeat">
+      <a:schemeClr val="tx1"/>
+    </dgm:txFillClrLst>
+    <dgm:txEffectClrLst/>
+  </dgm:styleLbl>
+  <dgm:styleLbl name="parChTrans1D4">
+    <dgm:fillClrLst meth="repeat">
+      <a:schemeClr val="accent1"/>
+    </dgm:fillClrLst>
+    <dgm:linClrLst meth="repeat">
+      <a:schemeClr val="accent1">
+        <a:shade val="80000"/>
+      </a:schemeClr>
+    </dgm:linClrLst>
+    <dgm:effectClrLst/>
+    <dgm:txLinClrLst/>
+    <dgm:txFillClrLst meth="repeat">
+      <a:schemeClr val="tx1"/>
+    </dgm:txFillClrLst>
+    <dgm:txEffectClrLst/>
+  </dgm:styleLbl>
+  <dgm:styleLbl name="fgAcc1">
+    <dgm:fillClrLst meth="repeat">
+      <a:schemeClr val="lt1">
+        <a:alpha val="90000"/>
+      </a:schemeClr>
+    </dgm:fillClrLst>
+    <dgm:linClrLst meth="repeat">
+      <a:schemeClr val="accent1"/>
+    </dgm:linClrLst>
+    <dgm:effectClrLst/>
+    <dgm:txLinClrLst/>
+    <dgm:txFillClrLst meth="repeat">
+      <a:schemeClr val="dk1"/>
+    </dgm:txFillClrLst>
+    <dgm:txEffectClrLst/>
+  </dgm:styleLbl>
+  <dgm:styleLbl name="conFgAcc1">
+    <dgm:fillClrLst meth="repeat">
+      <a:schemeClr val="lt1">
+        <a:alpha val="90000"/>
+      </a:schemeClr>
+    </dgm:fillClrLst>
+    <dgm:linClrLst meth="repeat">
+      <a:schemeClr val="accent1"/>
+    </dgm:linClrLst>
+    <dgm:effectClrLst/>
+    <dgm:txLinClrLst/>
+    <dgm:txFillClrLst meth="repeat">
+      <a:schemeClr val="dk1"/>
+    </dgm:txFillClrLst>
+    <dgm:txEffectClrLst/>
+  </dgm:styleLbl>
+  <dgm:styleLbl name="alignAcc1">
+    <dgm:fillClrLst meth="repeat">
+      <a:schemeClr val="lt1">
+        <a:alpha val="90000"/>
+      </a:schemeClr>
+    </dgm:fillClrLst>
+    <dgm:linClrLst meth="repeat">
+      <a:schemeClr val="accent1"/>
+    </dgm:linClrLst>
+    <dgm:effectClrLst/>
+    <dgm:txLinClrLst/>
+    <dgm:txFillClrLst meth="repeat">
+      <a:schemeClr val="dk1"/>
+    </dgm:txFillClrLst>
+    <dgm:txEffectClrLst/>
+  </dgm:styleLbl>
+  <dgm:styleLbl name="trAlignAcc1">
+    <dgm:fillClrLst meth="repeat">
+      <a:schemeClr val="lt1">
+        <a:alpha val="40000"/>
+      </a:schemeClr>
+    </dgm:fillClrLst>
+    <dgm:linClrLst meth="repeat">
+      <a:schemeClr val="accent1"/>
+    </dgm:linClrLst>
+    <dgm:effectClrLst/>
+    <dgm:txLinClrLst/>
+    <dgm:txFillClrLst meth="repeat">
+      <a:schemeClr val="dk1"/>
+    </dgm:txFillClrLst>
+    <dgm:txEffectClrLst/>
+  </dgm:styleLbl>
+  <dgm:styleLbl name="bgAcc1">
+    <dgm:fillClrLst meth="repeat">
+      <a:schemeClr val="lt1">
+        <a:alpha val="90000"/>
+      </a:schemeClr>
+    </dgm:fillClrLst>
+    <dgm:linClrLst meth="repeat">
+      <a:schemeClr val="accent1"/>
+    </dgm:linClrLst>
+    <dgm:effectClrLst/>
+    <dgm:txLinClrLst/>
+    <dgm:txFillClrLst meth="repeat">
+      <a:schemeClr val="dk1"/>
+    </dgm:txFillClrLst>
+    <dgm:txEffectClrLst/>
+  </dgm:styleLbl>
+  <dgm:styleLbl name="solidFgAcc1">
+    <dgm:fillClrLst meth="repeat">
+      <a:schemeClr val="lt1"/>
+    </dgm:fillClrLst>
+    <dgm:linClrLst meth="repeat">
+      <a:schemeClr val="accent1"/>
+    </dgm:linClrLst>
+    <dgm:effectClrLst/>
+    <dgm:txLinClrLst/>
+    <dgm:txFillClrLst meth="repeat">
+      <a:schemeClr val="dk1"/>
+    </dgm:txFillClrLst>
+    <dgm:txEffectClrLst/>
+  </dgm:styleLbl>
+  <dgm:styleLbl name="solidAlignAcc1">
+    <dgm:fillClrLst meth="repeat">
+      <a:schemeClr val="lt1"/>
+    </dgm:fillClrLst>
+    <dgm:linClrLst meth="repeat">
+      <a:schemeClr val="accent1"/>
+    </dgm:linClrLst>
+    <dgm:effectClrLst/>
+    <dgm:txLinClrLst/>
+    <dgm:txFillClrLst meth="repeat">
+      <a:schemeClr val="dk1"/>
+    </dgm:txFillClrLst>
+    <dgm:txEffectClrLst/>
+  </dgm:styleLbl>
+  <dgm:styleLbl name="solidBgAcc1">
+    <dgm:fillClrLst meth="repeat">
+      <a:schemeClr val="lt1"/>
+    </dgm:fillClrLst>
+    <dgm:linClrLst meth="repeat">
+      <a:schemeClr val="accent1"/>
+    </dgm:linClrLst>
+    <dgm:effectClrLst/>
+    <dgm:txLinClrLst/>
+    <dgm:txFillClrLst meth="repeat">
+      <a:schemeClr val="dk1"/>
+    </dgm:txFillClrLst>
+    <dgm:txEffectClrLst/>
+  </dgm:styleLbl>
+  <dgm:styleLbl name="fgAccFollowNode1">
+    <dgm:fillClrLst meth="repeat">
+      <a:schemeClr val="accent1">
+        <a:alpha val="90000"/>
+        <a:tint val="40000"/>
+      </a:schemeClr>
+    </dgm:fillClrLst>
+    <dgm:linClrLst meth="repeat">
+      <a:schemeClr val="accent1">
+        <a:alpha val="90000"/>
+        <a:tint val="40000"/>
+      </a:schemeClr>
+    </dgm:linClrLst>
+    <dgm:effectClrLst/>
+    <dgm:txLinClrLst/>
+    <dgm:txFillClrLst meth="repeat">
+      <a:schemeClr val="dk1"/>
+    </dgm:txFillClrLst>
+    <dgm:txEffectClrLst/>
+  </dgm:styleLbl>
+  <dgm:styleLbl name="alignAccFollowNode1">
+    <dgm:fillClrLst meth="repeat">
+      <a:schemeClr val="accent1">
+        <a:alpha val="90000"/>
+        <a:tint val="40000"/>
+      </a:schemeClr>
+    </dgm:fillClrLst>
+    <dgm:linClrLst meth="repeat">
+      <a:schemeClr val="accent1">
+        <a:alpha val="90000"/>
+        <a:tint val="40000"/>
+      </a:schemeClr>
+    </dgm:linClrLst>
+    <dgm:effectClrLst/>
+    <dgm:txLinClrLst/>
+    <dgm:txFillClrLst meth="repeat">
+      <a:schemeClr val="dk1"/>
+    </dgm:txFillClrLst>
+    <dgm:txEffectClrLst/>
+  </dgm:styleLbl>
+  <dgm:styleLbl name="bgAccFollowNode1">
+    <dgm:fillClrLst meth="repeat">
+      <a:schemeClr val="accent1">
+        <a:alpha val="90000"/>
+        <a:tint val="40000"/>
+      </a:schemeClr>
+    </dgm:fillClrLst>
+    <dgm:linClrLst meth="repeat">
+      <a:schemeClr val="accent1">
+        <a:alpha val="90000"/>
+        <a:tint val="40000"/>
+      </a:schemeClr>
+    </dgm:linClrLst>
+    <dgm:effectClrLst/>
+    <dgm:txLinClrLst/>
+    <dgm:txFillClrLst meth="repeat">
+      <a:schemeClr val="dk1"/>
+    </dgm:txFillClrLst>
+    <dgm:txEffectClrLst/>
+  </dgm:styleLbl>
+  <dgm:styleLbl name="fgAcc0">
+    <dgm:fillClrLst meth="repeat">
+      <a:schemeClr val="lt1">
+        <a:alpha val="90000"/>
+      </a:schemeClr>
+    </dgm:fillClrLst>
+    <dgm:linClrLst meth="repeat">
+      <a:schemeClr val="accent1"/>
+    </dgm:linClrLst>
+    <dgm:effectClrLst/>
+    <dgm:txLinClrLst/>
+    <dgm:txFillClrLst meth="repeat">
+      <a:schemeClr val="dk1"/>
+    </dgm:txFillClrLst>
+    <dgm:txEffectClrLst/>
+  </dgm:styleLbl>
+  <dgm:styleLbl name="fgAcc2">
+    <dgm:fillClrLst meth="repeat">
+      <a:schemeClr val="lt1">
+        <a:alpha val="90000"/>
+      </a:schemeClr>
+    </dgm:fillClrLst>
+    <dgm:linClrLst meth="repeat">
+      <a:schemeClr val="accent1"/>
+    </dgm:linClrLst>
+    <dgm:effectClrLst/>
+    <dgm:txLinClrLst/>
+    <dgm:txFillClrLst meth="repeat">
+      <a:schemeClr val="dk1"/>
+    </dgm:txFillClrLst>
+    <dgm:txEffectClrLst/>
+  </dgm:styleLbl>
+  <dgm:styleLbl name="fgAcc3">
+    <dgm:fillClrLst meth="repeat">
+      <a:schemeClr val="lt1">
+        <a:alpha val="90000"/>
+      </a:schemeClr>
+    </dgm:fillClrLst>
+    <dgm:linClrLst meth="repeat">
+      <a:schemeClr val="accent1"/>
+    </dgm:linClrLst>
+    <dgm:effectClrLst/>
+    <dgm:txLinClrLst/>
+    <dgm:txFillClrLst meth="repeat">
+      <a:schemeClr val="dk1"/>
+    </dgm:txFillClrLst>
+    <dgm:txEffectClrLst/>
+  </dgm:styleLbl>
+  <dgm:styleLbl name="fgAcc4">
+    <dgm:fillClrLst meth="repeat">
+      <a:schemeClr val="lt1">
+        <a:alpha val="90000"/>
+      </a:schemeClr>
+    </dgm:fillClrLst>
+    <dgm:linClrLst meth="repeat">
+      <a:schemeClr val="accent1"/>
+    </dgm:linClrLst>
+    <dgm:effectClrLst/>
+    <dgm:txLinClrLst/>
+    <dgm:txFillClrLst meth="repeat">
+      <a:schemeClr val="dk1"/>
+    </dgm:txFillClrLst>
+    <dgm:txEffectClrLst/>
+  </dgm:styleLbl>
+  <dgm:styleLbl name="bgShp">
+    <dgm:fillClrLst meth="repeat">
+      <a:schemeClr val="accent1">
+        <a:tint val="40000"/>
+      </a:schemeClr>
+    </dgm:fillClrLst>
+    <dgm:linClrLst meth="repeat">
+      <a:schemeClr val="accent1"/>
+    </dgm:linClrLst>
+    <dgm:effectClrLst/>
+    <dgm:txLinClrLst/>
+    <dgm:txFillClrLst meth="repeat">
+      <a:schemeClr val="dk1"/>
+    </dgm:txFillClrLst>
+    <dgm:txEffectClrLst/>
+  </dgm:styleLbl>
+  <dgm:styleLbl name="dkBgShp">
+    <dgm:fillClrLst meth="repeat">
+      <a:schemeClr val="accent1">
+        <a:shade val="80000"/>
+      </a:schemeClr>
+    </dgm:fillClrLst>
+    <dgm:linClrLst meth="repeat">
+      <a:schemeClr val="accent1"/>
+    </dgm:linClrLst>
+    <dgm:effectClrLst/>
+    <dgm:txLinClrLst/>
+    <dgm:txFillClrLst meth="repeat">
+      <a:schemeClr val="lt1"/>
+    </dgm:txFillClrLst>
+    <dgm:txEffectClrLst/>
+  </dgm:styleLbl>
+  <dgm:styleLbl name="trBgShp">
+    <dgm:fillClrLst meth="repeat">
+      <a:schemeClr val="accent1">
+        <a:tint val="50000"/>
+        <a:alpha val="40000"/>
+      </a:schemeClr>
+    </dgm:fillClrLst>
+    <dgm:linClrLst meth="repeat">
+      <a:schemeClr val="accent1"/>
+    </dgm:linClrLst>
+    <dgm:effectClrLst/>
+    <dgm:txLinClrLst/>
+    <dgm:txFillClrLst meth="repeat">
+      <a:schemeClr val="lt1"/>
+    </dgm:txFillClrLst>
+    <dgm:txEffectClrLst/>
+  </dgm:styleLbl>
+  <dgm:styleLbl name="fgShp">
+    <dgm:fillClrLst meth="repeat">
+      <a:schemeClr val="accent1">
+        <a:tint val="60000"/>
+      </a:schemeClr>
+    </dgm:fillClrLst>
+    <dgm:linClrLst meth="repeat">
+      <a:schemeClr val="lt1"/>
+    </dgm:linClrLst>
+    <dgm:effectClrLst/>
+    <dgm:txLinClrLst/>
+    <dgm:txFillClrLst meth="repeat">
+      <a:schemeClr val="dk1"/>
+    </dgm:txFillClrLst>
+    <dgm:txEffectClrLst/>
+  </dgm:styleLbl>
+  <dgm:styleLbl name="revTx">
+    <dgm:fillClrLst meth="repeat">
+      <a:schemeClr val="lt1">
+        <a:alpha val="0"/>
+      </a:schemeClr>
+    </dgm:fillClrLst>
+    <dgm:linClrLst meth="repeat">
+      <a:schemeClr val="dk1">
+        <a:alpha val="0"/>
+      </a:schemeClr>
+    </dgm:linClrLst>
+    <dgm:effectClrLst/>
+    <dgm:txLinClrLst/>
+    <dgm:txFillClrLst meth="repeat">
+      <a:schemeClr val="tx1"/>
+    </dgm:txFillClrLst>
+    <dgm:txEffectClrLst/>
+  </dgm:styleLbl>
+</dgm:colorsDef>
+</file>
+
+<file path=ppt/diagrams/data1.xml><?xml version="1.0" encoding="utf-8"?>
+<dgm:dataModel xmlns:dgm="http://schemas.openxmlformats.org/drawingml/2006/diagram" xmlns:a="http://schemas.openxmlformats.org/drawingml/2006/main">
+  <dgm:ptLst>
+    <dgm:pt modelId="{92AE4B89-FA5E-460F-A843-57D8DE86E685}" type="doc">
+      <dgm:prSet loTypeId="urn:microsoft.com/office/officeart/2008/layout/BendingPictureCaptionList" loCatId="picture" qsTypeId="urn:microsoft.com/office/officeart/2005/8/quickstyle/simple1" qsCatId="simple" csTypeId="urn:microsoft.com/office/officeart/2005/8/colors/accent1_2" csCatId="accent1" phldr="1"/>
+      <dgm:spPr/>
+      <dgm:t>
+        <a:bodyPr/>
+        <a:lstStyle/>
+        <a:p>
+          <a:endParaRPr lang="uk-UA"/>
+        </a:p>
+      </dgm:t>
+    </dgm:pt>
+    <dgm:pt modelId="{9FEAB8D0-274F-4222-8A6F-28A2B86AC484}">
+      <dgm:prSet phldrT="[Text]"/>
+      <dgm:spPr/>
+      <dgm:t>
+        <a:bodyPr/>
+        <a:lstStyle/>
+        <a:p>
+          <a:r>
+            <a:rPr lang="en-US" dirty="0" smtClean="0"/>
+            <a:t>Like</a:t>
+          </a:r>
+          <a:endParaRPr lang="uk-UA" dirty="0"/>
+        </a:p>
+      </dgm:t>
+    </dgm:pt>
+    <dgm:pt modelId="{3A162B14-A301-4626-9D50-2B4128D82790}" type="parTrans" cxnId="{E9E35569-C3D9-4BF7-B70B-0186DFE2941A}">
+      <dgm:prSet/>
+      <dgm:spPr/>
+      <dgm:t>
+        <a:bodyPr/>
+        <a:lstStyle/>
+        <a:p>
+          <a:endParaRPr lang="uk-UA"/>
+        </a:p>
+      </dgm:t>
+    </dgm:pt>
+    <dgm:pt modelId="{C9DFDFD5-7F65-444E-9624-7C295CDD27C0}" type="sibTrans" cxnId="{E9E35569-C3D9-4BF7-B70B-0186DFE2941A}">
+      <dgm:prSet/>
+      <dgm:spPr/>
+      <dgm:t>
+        <a:bodyPr/>
+        <a:lstStyle/>
+        <a:p>
+          <a:endParaRPr lang="uk-UA"/>
+        </a:p>
+      </dgm:t>
+    </dgm:pt>
+    <dgm:pt modelId="{109F65A3-C860-4A09-9229-76BE007395D9}">
+      <dgm:prSet phldrT="[Text]"/>
+      <dgm:spPr/>
+      <dgm:t>
+        <a:bodyPr/>
+        <a:lstStyle/>
+        <a:p>
+          <a:r>
+            <a:rPr lang="en-US" dirty="0" smtClean="0"/>
+            <a:t>Plus</a:t>
+          </a:r>
+          <a:endParaRPr lang="uk-UA" dirty="0"/>
+        </a:p>
+      </dgm:t>
+    </dgm:pt>
+    <dgm:pt modelId="{1DAA6196-6B67-4EBE-8B36-0ED2B1F351C7}" type="parTrans" cxnId="{6E71E54A-949E-45D5-9D36-2DFBD3FFC4A8}">
+      <dgm:prSet/>
+      <dgm:spPr/>
+      <dgm:t>
+        <a:bodyPr/>
+        <a:lstStyle/>
+        <a:p>
+          <a:endParaRPr lang="uk-UA"/>
+        </a:p>
+      </dgm:t>
+    </dgm:pt>
+    <dgm:pt modelId="{4B34FEFC-E1C0-4B86-9584-4A78F2FFBD7C}" type="sibTrans" cxnId="{6E71E54A-949E-45D5-9D36-2DFBD3FFC4A8}">
+      <dgm:prSet/>
+      <dgm:spPr/>
+      <dgm:t>
+        <a:bodyPr/>
+        <a:lstStyle/>
+        <a:p>
+          <a:endParaRPr lang="uk-UA"/>
+        </a:p>
+      </dgm:t>
+    </dgm:pt>
+    <dgm:pt modelId="{FBDBA227-CCDF-4FCB-A50C-903634845432}">
+      <dgm:prSet phldrT="[Text]"/>
+      <dgm:spPr/>
+      <dgm:t>
+        <a:bodyPr/>
+        <a:lstStyle/>
+        <a:p>
+          <a:r>
+            <a:rPr lang="en-US" dirty="0" smtClean="0"/>
+            <a:t>Tweet</a:t>
+          </a:r>
+          <a:endParaRPr lang="uk-UA" dirty="0"/>
+        </a:p>
+      </dgm:t>
+    </dgm:pt>
+    <dgm:pt modelId="{6CDC6813-088F-43BD-90A9-D95CADC8A21F}" type="parTrans" cxnId="{4EDEFB72-3D05-4A5E-977D-81667CBB7E1D}">
+      <dgm:prSet/>
+      <dgm:spPr/>
+      <dgm:t>
+        <a:bodyPr/>
+        <a:lstStyle/>
+        <a:p>
+          <a:endParaRPr lang="uk-UA"/>
+        </a:p>
+      </dgm:t>
+    </dgm:pt>
+    <dgm:pt modelId="{E26DBE19-89E9-40D4-8D88-B537CC0AB5F1}" type="sibTrans" cxnId="{4EDEFB72-3D05-4A5E-977D-81667CBB7E1D}">
+      <dgm:prSet/>
+      <dgm:spPr/>
+      <dgm:t>
+        <a:bodyPr/>
+        <a:lstStyle/>
+        <a:p>
+          <a:endParaRPr lang="uk-UA"/>
+        </a:p>
+      </dgm:t>
+    </dgm:pt>
+    <dgm:pt modelId="{0D83FDDC-2003-46C7-BFAE-4DF97D5CF594}">
+      <dgm:prSet phldrT="[Text]"/>
+      <dgm:spPr/>
+      <dgm:t>
+        <a:bodyPr/>
+        <a:lstStyle/>
+        <a:p>
+          <a:r>
+            <a:rPr lang="en-US" dirty="0" smtClean="0"/>
+            <a:t>Share</a:t>
+          </a:r>
+          <a:endParaRPr lang="uk-UA" dirty="0"/>
+        </a:p>
+      </dgm:t>
+    </dgm:pt>
+    <dgm:pt modelId="{0DCB7342-CFFA-4598-9FAE-205ED93D35AB}" type="parTrans" cxnId="{56E523C2-CCAF-4FD3-8F33-D274BCBF5B96}">
+      <dgm:prSet/>
+      <dgm:spPr/>
+      <dgm:t>
+        <a:bodyPr/>
+        <a:lstStyle/>
+        <a:p>
+          <a:endParaRPr lang="uk-UA"/>
+        </a:p>
+      </dgm:t>
+    </dgm:pt>
+    <dgm:pt modelId="{1018ADB1-8B6F-4CB1-B94C-8E26DB6D96EF}" type="sibTrans" cxnId="{56E523C2-CCAF-4FD3-8F33-D274BCBF5B96}">
+      <dgm:prSet/>
+      <dgm:spPr/>
+      <dgm:t>
+        <a:bodyPr/>
+        <a:lstStyle/>
+        <a:p>
+          <a:endParaRPr lang="uk-UA"/>
+        </a:p>
+      </dgm:t>
+    </dgm:pt>
+    <dgm:pt modelId="{0DA6CF1D-E196-4341-A0EB-1A4EDBCC0F99}" type="pres">
+      <dgm:prSet presAssocID="{92AE4B89-FA5E-460F-A843-57D8DE86E685}" presName="Name0" presStyleCnt="0">
+        <dgm:presLayoutVars>
+          <dgm:dir/>
+          <dgm:resizeHandles val="exact"/>
+        </dgm:presLayoutVars>
+      </dgm:prSet>
+      <dgm:spPr/>
+      <dgm:t>
+        <a:bodyPr/>
+        <a:lstStyle/>
+        <a:p>
+          <a:endParaRPr lang="uk-UA"/>
+        </a:p>
+      </dgm:t>
+    </dgm:pt>
+    <dgm:pt modelId="{2B1DE54D-FA1B-43B1-90EF-768B28D71C41}" type="pres">
+      <dgm:prSet presAssocID="{9FEAB8D0-274F-4222-8A6F-28A2B86AC484}" presName="composite" presStyleCnt="0"/>
+      <dgm:spPr/>
+    </dgm:pt>
+    <dgm:pt modelId="{AEAEAF00-0AD7-419C-8781-0B47C6DC736B}" type="pres">
+      <dgm:prSet presAssocID="{9FEAB8D0-274F-4222-8A6F-28A2B86AC484}" presName="rect1" presStyleLbl="bgImgPlace1" presStyleIdx="0" presStyleCnt="4"/>
+      <dgm:spPr>
+        <a:blipFill>
+          <a:blip xmlns:r="http://schemas.openxmlformats.org/officeDocument/2006/relationships" r:embed="rId1">
+            <a:extLst>
+              <a:ext uri="{28A0092B-C50C-407E-A947-70E740481C1C}">
+                <a14:useLocalDpi xmlns:a14="http://schemas.microsoft.com/office/drawing/2010/main" val="0"/>
+              </a:ext>
+            </a:extLst>
+          </a:blip>
+          <a:srcRect/>
+          <a:stretch>
+            <a:fillRect t="-12000" b="-12000"/>
+          </a:stretch>
+        </a:blipFill>
+      </dgm:spPr>
+      <dgm:t>
+        <a:bodyPr/>
+        <a:lstStyle/>
+        <a:p>
+          <a:endParaRPr lang="uk-UA"/>
+        </a:p>
+      </dgm:t>
+    </dgm:pt>
+    <dgm:pt modelId="{01301E56-5690-4A2D-9C44-E9534343AF9B}" type="pres">
+      <dgm:prSet presAssocID="{9FEAB8D0-274F-4222-8A6F-28A2B86AC484}" presName="wedgeRectCallout1" presStyleLbl="node1" presStyleIdx="0" presStyleCnt="4">
+        <dgm:presLayoutVars>
+          <dgm:bulletEnabled val="1"/>
+        </dgm:presLayoutVars>
+      </dgm:prSet>
+      <dgm:spPr/>
+      <dgm:t>
+        <a:bodyPr/>
+        <a:lstStyle/>
+        <a:p>
+          <a:endParaRPr lang="uk-UA"/>
+        </a:p>
+      </dgm:t>
+    </dgm:pt>
+    <dgm:pt modelId="{7783EF5B-49E2-4ECD-8BC4-ECBCA8A297DA}" type="pres">
+      <dgm:prSet presAssocID="{C9DFDFD5-7F65-444E-9624-7C295CDD27C0}" presName="sibTrans" presStyleCnt="0"/>
+      <dgm:spPr/>
+    </dgm:pt>
+    <dgm:pt modelId="{7DCDCDCD-2B88-47AA-91E9-3F9CEF8746F6}" type="pres">
+      <dgm:prSet presAssocID="{109F65A3-C860-4A09-9229-76BE007395D9}" presName="composite" presStyleCnt="0"/>
+      <dgm:spPr/>
+    </dgm:pt>
+    <dgm:pt modelId="{1F52055F-89CD-4B6F-A6AE-86A92732CF07}" type="pres">
+      <dgm:prSet presAssocID="{109F65A3-C860-4A09-9229-76BE007395D9}" presName="rect1" presStyleLbl="bgImgPlace1" presStyleIdx="1" presStyleCnt="4"/>
+      <dgm:spPr>
+        <a:blipFill>
+          <a:blip xmlns:r="http://schemas.openxmlformats.org/officeDocument/2006/relationships" r:embed="rId2">
+            <a:extLst>
+              <a:ext uri="{28A0092B-C50C-407E-A947-70E740481C1C}">
+                <a14:useLocalDpi xmlns:a14="http://schemas.microsoft.com/office/drawing/2010/main" val="0"/>
+              </a:ext>
+            </a:extLst>
+          </a:blip>
+          <a:srcRect/>
+          <a:stretch>
+            <a:fillRect t="-12000" b="-12000"/>
+          </a:stretch>
+        </a:blipFill>
+      </dgm:spPr>
+      <dgm:t>
+        <a:bodyPr/>
+        <a:lstStyle/>
+        <a:p>
+          <a:endParaRPr lang="uk-UA"/>
+        </a:p>
+      </dgm:t>
+    </dgm:pt>
+    <dgm:pt modelId="{D7CFAD6C-8749-4E80-B986-1915077D2EBD}" type="pres">
+      <dgm:prSet presAssocID="{109F65A3-C860-4A09-9229-76BE007395D9}" presName="wedgeRectCallout1" presStyleLbl="node1" presStyleIdx="1" presStyleCnt="4">
+        <dgm:presLayoutVars>
+          <dgm:bulletEnabled val="1"/>
+        </dgm:presLayoutVars>
+      </dgm:prSet>
+      <dgm:spPr/>
+      <dgm:t>
+        <a:bodyPr/>
+        <a:lstStyle/>
+        <a:p>
+          <a:endParaRPr lang="uk-UA"/>
+        </a:p>
+      </dgm:t>
+    </dgm:pt>
+    <dgm:pt modelId="{275E7865-A386-493C-A81B-FB44981D32E0}" type="pres">
+      <dgm:prSet presAssocID="{4B34FEFC-E1C0-4B86-9584-4A78F2FFBD7C}" presName="sibTrans" presStyleCnt="0"/>
+      <dgm:spPr/>
+    </dgm:pt>
+    <dgm:pt modelId="{F158563D-914C-4D16-A422-BB4A4A520C0E}" type="pres">
+      <dgm:prSet presAssocID="{FBDBA227-CCDF-4FCB-A50C-903634845432}" presName="composite" presStyleCnt="0"/>
+      <dgm:spPr/>
+    </dgm:pt>
+    <dgm:pt modelId="{6EA8D655-BF40-419C-8E09-B5383BCE1317}" type="pres">
+      <dgm:prSet presAssocID="{FBDBA227-CCDF-4FCB-A50C-903634845432}" presName="rect1" presStyleLbl="bgImgPlace1" presStyleIdx="2" presStyleCnt="4"/>
+      <dgm:spPr>
+        <a:blipFill>
+          <a:blip xmlns:r="http://schemas.openxmlformats.org/officeDocument/2006/relationships" r:embed="rId3">
+            <a:extLst>
+              <a:ext uri="{28A0092B-C50C-407E-A947-70E740481C1C}">
+                <a14:useLocalDpi xmlns:a14="http://schemas.microsoft.com/office/drawing/2010/main" val="0"/>
+              </a:ext>
+            </a:extLst>
+          </a:blip>
+          <a:srcRect/>
+          <a:stretch>
+            <a:fillRect t="-12000" b="-12000"/>
+          </a:stretch>
+        </a:blipFill>
+      </dgm:spPr>
+      <dgm:t>
+        <a:bodyPr/>
+        <a:lstStyle/>
+        <a:p>
+          <a:endParaRPr lang="uk-UA"/>
+        </a:p>
+      </dgm:t>
+    </dgm:pt>
+    <dgm:pt modelId="{50646914-29DA-46A5-827E-723E3B21A12D}" type="pres">
+      <dgm:prSet presAssocID="{FBDBA227-CCDF-4FCB-A50C-903634845432}" presName="wedgeRectCallout1" presStyleLbl="node1" presStyleIdx="2" presStyleCnt="4">
+        <dgm:presLayoutVars>
+          <dgm:bulletEnabled val="1"/>
+        </dgm:presLayoutVars>
+      </dgm:prSet>
+      <dgm:spPr/>
+      <dgm:t>
+        <a:bodyPr/>
+        <a:lstStyle/>
+        <a:p>
+          <a:endParaRPr lang="uk-UA"/>
+        </a:p>
+      </dgm:t>
+    </dgm:pt>
+    <dgm:pt modelId="{1FF15B6B-9863-42D2-827B-21FA5A940FA7}" type="pres">
+      <dgm:prSet presAssocID="{E26DBE19-89E9-40D4-8D88-B537CC0AB5F1}" presName="sibTrans" presStyleCnt="0"/>
+      <dgm:spPr/>
+    </dgm:pt>
+    <dgm:pt modelId="{5E278E08-D881-44AF-B446-4FABCC20D891}" type="pres">
+      <dgm:prSet presAssocID="{0D83FDDC-2003-46C7-BFAE-4DF97D5CF594}" presName="composite" presStyleCnt="0"/>
+      <dgm:spPr/>
+    </dgm:pt>
+    <dgm:pt modelId="{7211D0F6-1B30-40CD-B99A-7B6213DCDA69}" type="pres">
+      <dgm:prSet presAssocID="{0D83FDDC-2003-46C7-BFAE-4DF97D5CF594}" presName="rect1" presStyleLbl="bgImgPlace1" presStyleIdx="3" presStyleCnt="4"/>
+      <dgm:spPr>
+        <a:blipFill>
+          <a:blip xmlns:r="http://schemas.openxmlformats.org/officeDocument/2006/relationships" r:embed="rId4">
+            <a:extLst>
+              <a:ext uri="{28A0092B-C50C-407E-A947-70E740481C1C}">
+                <a14:useLocalDpi xmlns:a14="http://schemas.microsoft.com/office/drawing/2010/main" val="0"/>
+              </a:ext>
+            </a:extLst>
+          </a:blip>
+          <a:srcRect/>
+          <a:stretch>
+            <a:fillRect t="-12000" b="-12000"/>
+          </a:stretch>
+        </a:blipFill>
+      </dgm:spPr>
+      <dgm:t>
+        <a:bodyPr/>
+        <a:lstStyle/>
+        <a:p>
+          <a:endParaRPr lang="uk-UA"/>
+        </a:p>
+      </dgm:t>
+    </dgm:pt>
+    <dgm:pt modelId="{F88E43D2-2555-499E-AC97-7A10ACA478E7}" type="pres">
+      <dgm:prSet presAssocID="{0D83FDDC-2003-46C7-BFAE-4DF97D5CF594}" presName="wedgeRectCallout1" presStyleLbl="node1" presStyleIdx="3" presStyleCnt="4">
+        <dgm:presLayoutVars>
+          <dgm:bulletEnabled val="1"/>
+        </dgm:presLayoutVars>
+      </dgm:prSet>
+      <dgm:spPr/>
+      <dgm:t>
+        <a:bodyPr/>
+        <a:lstStyle/>
+        <a:p>
+          <a:endParaRPr lang="uk-UA"/>
+        </a:p>
+      </dgm:t>
+    </dgm:pt>
+  </dgm:ptLst>
+  <dgm:cxnLst>
+    <dgm:cxn modelId="{FF18AFC0-75CF-4B4B-AC7B-0292FD1D01E1}" type="presOf" srcId="{109F65A3-C860-4A09-9229-76BE007395D9}" destId="{D7CFAD6C-8749-4E80-B986-1915077D2EBD}" srcOrd="0" destOrd="0" presId="urn:microsoft.com/office/officeart/2008/layout/BendingPictureCaptionList"/>
+    <dgm:cxn modelId="{4EDEFB72-3D05-4A5E-977D-81667CBB7E1D}" srcId="{92AE4B89-FA5E-460F-A843-57D8DE86E685}" destId="{FBDBA227-CCDF-4FCB-A50C-903634845432}" srcOrd="2" destOrd="0" parTransId="{6CDC6813-088F-43BD-90A9-D95CADC8A21F}" sibTransId="{E26DBE19-89E9-40D4-8D88-B537CC0AB5F1}"/>
+    <dgm:cxn modelId="{6E71E54A-949E-45D5-9D36-2DFBD3FFC4A8}" srcId="{92AE4B89-FA5E-460F-A843-57D8DE86E685}" destId="{109F65A3-C860-4A09-9229-76BE007395D9}" srcOrd="1" destOrd="0" parTransId="{1DAA6196-6B67-4EBE-8B36-0ED2B1F351C7}" sibTransId="{4B34FEFC-E1C0-4B86-9584-4A78F2FFBD7C}"/>
+    <dgm:cxn modelId="{56E523C2-CCAF-4FD3-8F33-D274BCBF5B96}" srcId="{92AE4B89-FA5E-460F-A843-57D8DE86E685}" destId="{0D83FDDC-2003-46C7-BFAE-4DF97D5CF594}" srcOrd="3" destOrd="0" parTransId="{0DCB7342-CFFA-4598-9FAE-205ED93D35AB}" sibTransId="{1018ADB1-8B6F-4CB1-B94C-8E26DB6D96EF}"/>
+    <dgm:cxn modelId="{E9E35569-C3D9-4BF7-B70B-0186DFE2941A}" srcId="{92AE4B89-FA5E-460F-A843-57D8DE86E685}" destId="{9FEAB8D0-274F-4222-8A6F-28A2B86AC484}" srcOrd="0" destOrd="0" parTransId="{3A162B14-A301-4626-9D50-2B4128D82790}" sibTransId="{C9DFDFD5-7F65-444E-9624-7C295CDD27C0}"/>
+    <dgm:cxn modelId="{69C52BC4-6B8D-4570-BD1D-E8E85C66F348}" type="presOf" srcId="{92AE4B89-FA5E-460F-A843-57D8DE86E685}" destId="{0DA6CF1D-E196-4341-A0EB-1A4EDBCC0F99}" srcOrd="0" destOrd="0" presId="urn:microsoft.com/office/officeart/2008/layout/BendingPictureCaptionList"/>
+    <dgm:cxn modelId="{2E144611-99CB-460A-AB7B-D9545BE1191A}" type="presOf" srcId="{9FEAB8D0-274F-4222-8A6F-28A2B86AC484}" destId="{01301E56-5690-4A2D-9C44-E9534343AF9B}" srcOrd="0" destOrd="0" presId="urn:microsoft.com/office/officeart/2008/layout/BendingPictureCaptionList"/>
+    <dgm:cxn modelId="{6B94FC72-C622-40A8-AFCB-9B3D8013438F}" type="presOf" srcId="{FBDBA227-CCDF-4FCB-A50C-903634845432}" destId="{50646914-29DA-46A5-827E-723E3B21A12D}" srcOrd="0" destOrd="0" presId="urn:microsoft.com/office/officeart/2008/layout/BendingPictureCaptionList"/>
+    <dgm:cxn modelId="{9A07488F-8A26-4DB1-9FE0-F1FFE0B3D159}" type="presOf" srcId="{0D83FDDC-2003-46C7-BFAE-4DF97D5CF594}" destId="{F88E43D2-2555-499E-AC97-7A10ACA478E7}" srcOrd="0" destOrd="0" presId="urn:microsoft.com/office/officeart/2008/layout/BendingPictureCaptionList"/>
+    <dgm:cxn modelId="{4EF6FF01-7E45-4E60-A725-0977D4685468}" type="presParOf" srcId="{0DA6CF1D-E196-4341-A0EB-1A4EDBCC0F99}" destId="{2B1DE54D-FA1B-43B1-90EF-768B28D71C41}" srcOrd="0" destOrd="0" presId="urn:microsoft.com/office/officeart/2008/layout/BendingPictureCaptionList"/>
+    <dgm:cxn modelId="{73F13480-DB8A-4D4A-8E95-D6214AFD970A}" type="presParOf" srcId="{2B1DE54D-FA1B-43B1-90EF-768B28D71C41}" destId="{AEAEAF00-0AD7-419C-8781-0B47C6DC736B}" srcOrd="0" destOrd="0" presId="urn:microsoft.com/office/officeart/2008/layout/BendingPictureCaptionList"/>
+    <dgm:cxn modelId="{B4303183-7928-4BD5-B803-C8A7A20F4A73}" type="presParOf" srcId="{2B1DE54D-FA1B-43B1-90EF-768B28D71C41}" destId="{01301E56-5690-4A2D-9C44-E9534343AF9B}" srcOrd="1" destOrd="0" presId="urn:microsoft.com/office/officeart/2008/layout/BendingPictureCaptionList"/>
+    <dgm:cxn modelId="{431B3967-78D3-4B5B-9EF0-D5352229FC91}" type="presParOf" srcId="{0DA6CF1D-E196-4341-A0EB-1A4EDBCC0F99}" destId="{7783EF5B-49E2-4ECD-8BC4-ECBCA8A297DA}" srcOrd="1" destOrd="0" presId="urn:microsoft.com/office/officeart/2008/layout/BendingPictureCaptionList"/>
+    <dgm:cxn modelId="{D57EE84D-2ADA-4D68-9E94-D6AE8B86E9C7}" type="presParOf" srcId="{0DA6CF1D-E196-4341-A0EB-1A4EDBCC0F99}" destId="{7DCDCDCD-2B88-47AA-91E9-3F9CEF8746F6}" srcOrd="2" destOrd="0" presId="urn:microsoft.com/office/officeart/2008/layout/BendingPictureCaptionList"/>
+    <dgm:cxn modelId="{B3B22093-FB96-41AF-AF49-ECD506D68E84}" type="presParOf" srcId="{7DCDCDCD-2B88-47AA-91E9-3F9CEF8746F6}" destId="{1F52055F-89CD-4B6F-A6AE-86A92732CF07}" srcOrd="0" destOrd="0" presId="urn:microsoft.com/office/officeart/2008/layout/BendingPictureCaptionList"/>
+    <dgm:cxn modelId="{3AA8E57A-CF62-4F6A-95EA-25D2BD9153ED}" type="presParOf" srcId="{7DCDCDCD-2B88-47AA-91E9-3F9CEF8746F6}" destId="{D7CFAD6C-8749-4E80-B986-1915077D2EBD}" srcOrd="1" destOrd="0" presId="urn:microsoft.com/office/officeart/2008/layout/BendingPictureCaptionList"/>
+    <dgm:cxn modelId="{E5D5325E-3DB8-443B-8DBD-9C7F845D9569}" type="presParOf" srcId="{0DA6CF1D-E196-4341-A0EB-1A4EDBCC0F99}" destId="{275E7865-A386-493C-A81B-FB44981D32E0}" srcOrd="3" destOrd="0" presId="urn:microsoft.com/office/officeart/2008/layout/BendingPictureCaptionList"/>
+    <dgm:cxn modelId="{3B329560-7B6A-40BF-92E5-9E3BF820F5A3}" type="presParOf" srcId="{0DA6CF1D-E196-4341-A0EB-1A4EDBCC0F99}" destId="{F158563D-914C-4D16-A422-BB4A4A520C0E}" srcOrd="4" destOrd="0" presId="urn:microsoft.com/office/officeart/2008/layout/BendingPictureCaptionList"/>
+    <dgm:cxn modelId="{1F68B889-96F8-4004-A693-C7329E2214F5}" type="presParOf" srcId="{F158563D-914C-4D16-A422-BB4A4A520C0E}" destId="{6EA8D655-BF40-419C-8E09-B5383BCE1317}" srcOrd="0" destOrd="0" presId="urn:microsoft.com/office/officeart/2008/layout/BendingPictureCaptionList"/>
+    <dgm:cxn modelId="{6032E86D-62CA-4265-825D-C59EB8EDCD81}" type="presParOf" srcId="{F158563D-914C-4D16-A422-BB4A4A520C0E}" destId="{50646914-29DA-46A5-827E-723E3B21A12D}" srcOrd="1" destOrd="0" presId="urn:microsoft.com/office/officeart/2008/layout/BendingPictureCaptionList"/>
+    <dgm:cxn modelId="{1A1173CA-8B5C-4F3A-AADB-C13F73667171}" type="presParOf" srcId="{0DA6CF1D-E196-4341-A0EB-1A4EDBCC0F99}" destId="{1FF15B6B-9863-42D2-827B-21FA5A940FA7}" srcOrd="5" destOrd="0" presId="urn:microsoft.com/office/officeart/2008/layout/BendingPictureCaptionList"/>
+    <dgm:cxn modelId="{62329A42-78C2-420D-B5CB-05D52A7AF842}" type="presParOf" srcId="{0DA6CF1D-E196-4341-A0EB-1A4EDBCC0F99}" destId="{5E278E08-D881-44AF-B446-4FABCC20D891}" srcOrd="6" destOrd="0" presId="urn:microsoft.com/office/officeart/2008/layout/BendingPictureCaptionList"/>
+    <dgm:cxn modelId="{2F22A362-23B7-4B0B-82B8-5C4B624AA4E1}" type="presParOf" srcId="{5E278E08-D881-44AF-B446-4FABCC20D891}" destId="{7211D0F6-1B30-40CD-B99A-7B6213DCDA69}" srcOrd="0" destOrd="0" presId="urn:microsoft.com/office/officeart/2008/layout/BendingPictureCaptionList"/>
+    <dgm:cxn modelId="{31FE181F-664B-46C5-89E7-A9737A709430}" type="presParOf" srcId="{5E278E08-D881-44AF-B446-4FABCC20D891}" destId="{F88E43D2-2555-499E-AC97-7A10ACA478E7}" srcOrd="1" destOrd="0" presId="urn:microsoft.com/office/officeart/2008/layout/BendingPictureCaptionList"/>
+  </dgm:cxnLst>
+  <dgm:bg/>
+  <dgm:whole/>
+  <dgm:extLst>
+    <a:ext uri="http://schemas.microsoft.com/office/drawing/2008/diagram">
+      <dsp:dataModelExt xmlns:dsp="http://schemas.microsoft.com/office/drawing/2008/diagram" relId="rId6" minVer="http://schemas.openxmlformats.org/drawingml/2006/diagram"/>
+    </a:ext>
+  </dgm:extLst>
+</dgm:dataModel>
+</file>
+
+<file path=ppt/diagrams/drawing1.xml><?xml version="1.0" encoding="utf-8"?>
+<dsp:drawing xmlns:dgm="http://schemas.openxmlformats.org/drawingml/2006/diagram" xmlns:dsp="http://schemas.microsoft.com/office/drawing/2008/diagram" xmlns:a="http://schemas.openxmlformats.org/drawingml/2006/main">
+  <dsp:spTree>
+    <dsp:nvGrpSpPr>
+      <dsp:cNvPr id="0" name=""/>
+      <dsp:cNvGrpSpPr/>
+    </dsp:nvGrpSpPr>
+    <dsp:grpSpPr/>
+    <dsp:sp modelId="{AEAEAF00-0AD7-419C-8781-0B47C6DC736B}">
+      <dsp:nvSpPr>
+        <dsp:cNvPr id="0" name=""/>
+        <dsp:cNvSpPr/>
+      </dsp:nvSpPr>
+      <dsp:spPr>
+        <a:xfrm>
+          <a:off x="2517" y="942101"/>
+          <a:ext cx="1997233" cy="1597786"/>
+        </a:xfrm>
+        <a:prstGeom prst="rect">
+          <a:avLst/>
+        </a:prstGeom>
+        <a:blipFill>
+          <a:blip xmlns:r="http://schemas.openxmlformats.org/officeDocument/2006/relationships" r:embed="rId1">
+            <a:extLst>
+              <a:ext uri="{28A0092B-C50C-407E-A947-70E740481C1C}">
+                <a14:useLocalDpi xmlns:a14="http://schemas.microsoft.com/office/drawing/2010/main" val="0"/>
+              </a:ext>
+            </a:extLst>
+          </a:blip>
+          <a:srcRect/>
+          <a:stretch>
+            <a:fillRect t="-12000" b="-12000"/>
+          </a:stretch>
+        </a:blipFill>
+        <a:ln w="19050" cap="rnd" cmpd="sng" algn="ctr">
+          <a:solidFill>
+            <a:schemeClr val="lt1">
+              <a:hueOff val="0"/>
+              <a:satOff val="0"/>
+              <a:lumOff val="0"/>
+              <a:alphaOff val="0"/>
+            </a:schemeClr>
+          </a:solidFill>
+          <a:prstDash val="solid"/>
+        </a:ln>
+        <a:effectLst/>
+      </dsp:spPr>
+      <dsp:style>
+        <a:lnRef idx="2">
+          <a:scrgbClr r="0" g="0" b="0"/>
+        </a:lnRef>
+        <a:fillRef idx="1">
+          <a:scrgbClr r="0" g="0" b="0"/>
+        </a:fillRef>
+        <a:effectRef idx="0">
+          <a:scrgbClr r="0" g="0" b="0"/>
+        </a:effectRef>
+        <a:fontRef idx="minor"/>
+      </dsp:style>
+    </dsp:sp>
+    <dsp:sp modelId="{01301E56-5690-4A2D-9C44-E9534343AF9B}">
+      <dsp:nvSpPr>
+        <dsp:cNvPr id="0" name=""/>
+        <dsp:cNvSpPr/>
+      </dsp:nvSpPr>
+      <dsp:spPr>
+        <a:xfrm>
+          <a:off x="182268" y="2380109"/>
+          <a:ext cx="1777537" cy="559225"/>
+        </a:xfrm>
+        <a:prstGeom prst="wedgeRectCallout">
+          <a:avLst>
+            <a:gd name="adj1" fmla="val 20250"/>
+            <a:gd name="adj2" fmla="val -60700"/>
+          </a:avLst>
+        </a:prstGeom>
+        <a:solidFill>
+          <a:schemeClr val="accent1">
+            <a:hueOff val="0"/>
+            <a:satOff val="0"/>
+            <a:lumOff val="0"/>
+            <a:alphaOff val="0"/>
+          </a:schemeClr>
+        </a:solidFill>
+        <a:ln w="19050" cap="rnd" cmpd="sng" algn="ctr">
+          <a:solidFill>
+            <a:schemeClr val="lt1">
+              <a:hueOff val="0"/>
+              <a:satOff val="0"/>
+              <a:lumOff val="0"/>
+              <a:alphaOff val="0"/>
+            </a:schemeClr>
+          </a:solidFill>
+          <a:prstDash val="solid"/>
+        </a:ln>
+        <a:effectLst/>
+      </dsp:spPr>
+      <dsp:style>
+        <a:lnRef idx="2">
+          <a:scrgbClr r="0" g="0" b="0"/>
+        </a:lnRef>
+        <a:fillRef idx="1">
+          <a:scrgbClr r="0" g="0" b="0"/>
+        </a:fillRef>
+        <a:effectRef idx="0">
+          <a:scrgbClr r="0" g="0" b="0"/>
+        </a:effectRef>
+        <a:fontRef idx="minor">
+          <a:schemeClr val="lt1"/>
+        </a:fontRef>
+      </dsp:style>
+      <dsp:txBody>
+        <a:bodyPr spcFirstLastPara="0" vert="horz" wrap="square" lIns="99060" tIns="99060" rIns="99060" bIns="99060" numCol="1" spcCol="1270" anchor="ctr" anchorCtr="0">
+          <a:noAutofit/>
+        </a:bodyPr>
+        <a:lstStyle/>
+        <a:p>
+          <a:pPr lvl="0" algn="ctr" defTabSz="1155700">
+            <a:lnSpc>
+              <a:spcPct val="90000"/>
+            </a:lnSpc>
+            <a:spcBef>
+              <a:spcPct val="0"/>
+            </a:spcBef>
+            <a:spcAft>
+              <a:spcPct val="35000"/>
+            </a:spcAft>
+          </a:pPr>
+          <a:r>
+            <a:rPr lang="en-US" sz="2600" kern="1200" dirty="0" smtClean="0"/>
+            <a:t>Like</a:t>
+          </a:r>
+          <a:endParaRPr lang="uk-UA" sz="2600" kern="1200" dirty="0"/>
+        </a:p>
+      </dsp:txBody>
+      <dsp:txXfrm>
+        <a:off x="182268" y="2380109"/>
+        <a:ext cx="1777537" cy="559225"/>
+      </dsp:txXfrm>
+    </dsp:sp>
+    <dsp:sp modelId="{1F52055F-89CD-4B6F-A6AE-86A92732CF07}">
+      <dsp:nvSpPr>
+        <dsp:cNvPr id="0" name=""/>
+        <dsp:cNvSpPr/>
+      </dsp:nvSpPr>
+      <dsp:spPr>
+        <a:xfrm>
+          <a:off x="2199473" y="942101"/>
+          <a:ext cx="1997233" cy="1597786"/>
+        </a:xfrm>
+        <a:prstGeom prst="rect">
+          <a:avLst/>
+        </a:prstGeom>
+        <a:blipFill>
+          <a:blip xmlns:r="http://schemas.openxmlformats.org/officeDocument/2006/relationships" r:embed="rId2">
+            <a:extLst>
+              <a:ext uri="{28A0092B-C50C-407E-A947-70E740481C1C}">
+                <a14:useLocalDpi xmlns:a14="http://schemas.microsoft.com/office/drawing/2010/main" val="0"/>
+              </a:ext>
+            </a:extLst>
+          </a:blip>
+          <a:srcRect/>
+          <a:stretch>
+            <a:fillRect t="-12000" b="-12000"/>
+          </a:stretch>
+        </a:blipFill>
+        <a:ln w="19050" cap="rnd" cmpd="sng" algn="ctr">
+          <a:solidFill>
+            <a:schemeClr val="lt1">
+              <a:hueOff val="0"/>
+              <a:satOff val="0"/>
+              <a:lumOff val="0"/>
+              <a:alphaOff val="0"/>
+            </a:schemeClr>
+          </a:solidFill>
+          <a:prstDash val="solid"/>
+        </a:ln>
+        <a:effectLst/>
+      </dsp:spPr>
+      <dsp:style>
+        <a:lnRef idx="2">
+          <a:scrgbClr r="0" g="0" b="0"/>
+        </a:lnRef>
+        <a:fillRef idx="1">
+          <a:scrgbClr r="0" g="0" b="0"/>
+        </a:fillRef>
+        <a:effectRef idx="0">
+          <a:scrgbClr r="0" g="0" b="0"/>
+        </a:effectRef>
+        <a:fontRef idx="minor"/>
+      </dsp:style>
+    </dsp:sp>
+    <dsp:sp modelId="{D7CFAD6C-8749-4E80-B986-1915077D2EBD}">
+      <dsp:nvSpPr>
+        <dsp:cNvPr id="0" name=""/>
+        <dsp:cNvSpPr/>
+      </dsp:nvSpPr>
+      <dsp:spPr>
+        <a:xfrm>
+          <a:off x="2379224" y="2380109"/>
+          <a:ext cx="1777537" cy="559225"/>
+        </a:xfrm>
+        <a:prstGeom prst="wedgeRectCallout">
+          <a:avLst>
+            <a:gd name="adj1" fmla="val 20250"/>
+            <a:gd name="adj2" fmla="val -60700"/>
+          </a:avLst>
+        </a:prstGeom>
+        <a:solidFill>
+          <a:schemeClr val="accent1">
+            <a:hueOff val="0"/>
+            <a:satOff val="0"/>
+            <a:lumOff val="0"/>
+            <a:alphaOff val="0"/>
+          </a:schemeClr>
+        </a:solidFill>
+        <a:ln w="19050" cap="rnd" cmpd="sng" algn="ctr">
+          <a:solidFill>
+            <a:schemeClr val="lt1">
+              <a:hueOff val="0"/>
+              <a:satOff val="0"/>
+              <a:lumOff val="0"/>
+              <a:alphaOff val="0"/>
+            </a:schemeClr>
+          </a:solidFill>
+          <a:prstDash val="solid"/>
+        </a:ln>
+        <a:effectLst/>
+      </dsp:spPr>
+      <dsp:style>
+        <a:lnRef idx="2">
+          <a:scrgbClr r="0" g="0" b="0"/>
+        </a:lnRef>
+        <a:fillRef idx="1">
+          <a:scrgbClr r="0" g="0" b="0"/>
+        </a:fillRef>
+        <a:effectRef idx="0">
+          <a:scrgbClr r="0" g="0" b="0"/>
+        </a:effectRef>
+        <a:fontRef idx="minor">
+          <a:schemeClr val="lt1"/>
+        </a:fontRef>
+      </dsp:style>
+      <dsp:txBody>
+        <a:bodyPr spcFirstLastPara="0" vert="horz" wrap="square" lIns="99060" tIns="99060" rIns="99060" bIns="99060" numCol="1" spcCol="1270" anchor="ctr" anchorCtr="0">
+          <a:noAutofit/>
+        </a:bodyPr>
+        <a:lstStyle/>
+        <a:p>
+          <a:pPr lvl="0" algn="ctr" defTabSz="1155700">
+            <a:lnSpc>
+              <a:spcPct val="90000"/>
+            </a:lnSpc>
+            <a:spcBef>
+              <a:spcPct val="0"/>
+            </a:spcBef>
+            <a:spcAft>
+              <a:spcPct val="35000"/>
+            </a:spcAft>
+          </a:pPr>
+          <a:r>
+            <a:rPr lang="en-US" sz="2600" kern="1200" dirty="0" smtClean="0"/>
+            <a:t>Plus</a:t>
+          </a:r>
+          <a:endParaRPr lang="uk-UA" sz="2600" kern="1200" dirty="0"/>
+        </a:p>
+      </dsp:txBody>
+      <dsp:txXfrm>
+        <a:off x="2379224" y="2380109"/>
+        <a:ext cx="1777537" cy="559225"/>
+      </dsp:txXfrm>
+    </dsp:sp>
+    <dsp:sp modelId="{6EA8D655-BF40-419C-8E09-B5383BCE1317}">
+      <dsp:nvSpPr>
+        <dsp:cNvPr id="0" name=""/>
+        <dsp:cNvSpPr/>
+      </dsp:nvSpPr>
+      <dsp:spPr>
+        <a:xfrm>
+          <a:off x="4396430" y="942101"/>
+          <a:ext cx="1997233" cy="1597786"/>
+        </a:xfrm>
+        <a:prstGeom prst="rect">
+          <a:avLst/>
+        </a:prstGeom>
+        <a:blipFill>
+          <a:blip xmlns:r="http://schemas.openxmlformats.org/officeDocument/2006/relationships" r:embed="rId3">
+            <a:extLst>
+              <a:ext uri="{28A0092B-C50C-407E-A947-70E740481C1C}">
+                <a14:useLocalDpi xmlns:a14="http://schemas.microsoft.com/office/drawing/2010/main" val="0"/>
+              </a:ext>
+            </a:extLst>
+          </a:blip>
+          <a:srcRect/>
+          <a:stretch>
+            <a:fillRect t="-12000" b="-12000"/>
+          </a:stretch>
+        </a:blipFill>
+        <a:ln w="19050" cap="rnd" cmpd="sng" algn="ctr">
+          <a:solidFill>
+            <a:schemeClr val="lt1">
+              <a:hueOff val="0"/>
+              <a:satOff val="0"/>
+              <a:lumOff val="0"/>
+              <a:alphaOff val="0"/>
+            </a:schemeClr>
+          </a:solidFill>
+          <a:prstDash val="solid"/>
+        </a:ln>
+        <a:effectLst/>
+      </dsp:spPr>
+      <dsp:style>
+        <a:lnRef idx="2">
+          <a:scrgbClr r="0" g="0" b="0"/>
+        </a:lnRef>
+        <a:fillRef idx="1">
+          <a:scrgbClr r="0" g="0" b="0"/>
+        </a:fillRef>
+        <a:effectRef idx="0">
+          <a:scrgbClr r="0" g="0" b="0"/>
+        </a:effectRef>
+        <a:fontRef idx="minor"/>
+      </dsp:style>
+    </dsp:sp>
+    <dsp:sp modelId="{50646914-29DA-46A5-827E-723E3B21A12D}">
+      <dsp:nvSpPr>
+        <dsp:cNvPr id="0" name=""/>
+        <dsp:cNvSpPr/>
+      </dsp:nvSpPr>
+      <dsp:spPr>
+        <a:xfrm>
+          <a:off x="4576181" y="2380109"/>
+          <a:ext cx="1777537" cy="559225"/>
+        </a:xfrm>
+        <a:prstGeom prst="wedgeRectCallout">
+          <a:avLst>
+            <a:gd name="adj1" fmla="val 20250"/>
+            <a:gd name="adj2" fmla="val -60700"/>
+          </a:avLst>
+        </a:prstGeom>
+        <a:solidFill>
+          <a:schemeClr val="accent1">
+            <a:hueOff val="0"/>
+            <a:satOff val="0"/>
+            <a:lumOff val="0"/>
+            <a:alphaOff val="0"/>
+          </a:schemeClr>
+        </a:solidFill>
+        <a:ln w="19050" cap="rnd" cmpd="sng" algn="ctr">
+          <a:solidFill>
+            <a:schemeClr val="lt1">
+              <a:hueOff val="0"/>
+              <a:satOff val="0"/>
+              <a:lumOff val="0"/>
+              <a:alphaOff val="0"/>
+            </a:schemeClr>
+          </a:solidFill>
+          <a:prstDash val="solid"/>
+        </a:ln>
+        <a:effectLst/>
+      </dsp:spPr>
+      <dsp:style>
+        <a:lnRef idx="2">
+          <a:scrgbClr r="0" g="0" b="0"/>
+        </a:lnRef>
+        <a:fillRef idx="1">
+          <a:scrgbClr r="0" g="0" b="0"/>
+        </a:fillRef>
+        <a:effectRef idx="0">
+          <a:scrgbClr r="0" g="0" b="0"/>
+        </a:effectRef>
+        <a:fontRef idx="minor">
+          <a:schemeClr val="lt1"/>
+        </a:fontRef>
+      </dsp:style>
+      <dsp:txBody>
+        <a:bodyPr spcFirstLastPara="0" vert="horz" wrap="square" lIns="99060" tIns="99060" rIns="99060" bIns="99060" numCol="1" spcCol="1270" anchor="ctr" anchorCtr="0">
+          <a:noAutofit/>
+        </a:bodyPr>
+        <a:lstStyle/>
+        <a:p>
+          <a:pPr lvl="0" algn="ctr" defTabSz="1155700">
+            <a:lnSpc>
+              <a:spcPct val="90000"/>
+            </a:lnSpc>
+            <a:spcBef>
+              <a:spcPct val="0"/>
+            </a:spcBef>
+            <a:spcAft>
+              <a:spcPct val="35000"/>
+            </a:spcAft>
+          </a:pPr>
+          <a:r>
+            <a:rPr lang="en-US" sz="2600" kern="1200" dirty="0" smtClean="0"/>
+            <a:t>Tweet</a:t>
+          </a:r>
+          <a:endParaRPr lang="uk-UA" sz="2600" kern="1200" dirty="0"/>
+        </a:p>
+      </dsp:txBody>
+      <dsp:txXfrm>
+        <a:off x="4576181" y="2380109"/>
+        <a:ext cx="1777537" cy="559225"/>
+      </dsp:txXfrm>
+    </dsp:sp>
+    <dsp:sp modelId="{7211D0F6-1B30-40CD-B99A-7B6213DCDA69}">
+      <dsp:nvSpPr>
+        <dsp:cNvPr id="0" name=""/>
+        <dsp:cNvSpPr/>
+      </dsp:nvSpPr>
+      <dsp:spPr>
+        <a:xfrm>
+          <a:off x="6593386" y="942101"/>
+          <a:ext cx="1997233" cy="1597786"/>
+        </a:xfrm>
+        <a:prstGeom prst="rect">
+          <a:avLst/>
+        </a:prstGeom>
+        <a:blipFill>
+          <a:blip xmlns:r="http://schemas.openxmlformats.org/officeDocument/2006/relationships" r:embed="rId4">
+            <a:extLst>
+              <a:ext uri="{28A0092B-C50C-407E-A947-70E740481C1C}">
+                <a14:useLocalDpi xmlns:a14="http://schemas.microsoft.com/office/drawing/2010/main" val="0"/>
+              </a:ext>
+            </a:extLst>
+          </a:blip>
+          <a:srcRect/>
+          <a:stretch>
+            <a:fillRect t="-12000" b="-12000"/>
+          </a:stretch>
+        </a:blipFill>
+        <a:ln w="19050" cap="rnd" cmpd="sng" algn="ctr">
+          <a:solidFill>
+            <a:schemeClr val="lt1">
+              <a:hueOff val="0"/>
+              <a:satOff val="0"/>
+              <a:lumOff val="0"/>
+              <a:alphaOff val="0"/>
+            </a:schemeClr>
+          </a:solidFill>
+          <a:prstDash val="solid"/>
+        </a:ln>
+        <a:effectLst/>
+      </dsp:spPr>
+      <dsp:style>
+        <a:lnRef idx="2">
+          <a:scrgbClr r="0" g="0" b="0"/>
+        </a:lnRef>
+        <a:fillRef idx="1">
+          <a:scrgbClr r="0" g="0" b="0"/>
+        </a:fillRef>
+        <a:effectRef idx="0">
+          <a:scrgbClr r="0" g="0" b="0"/>
+        </a:effectRef>
+        <a:fontRef idx="minor"/>
+      </dsp:style>
+    </dsp:sp>
+    <dsp:sp modelId="{F88E43D2-2555-499E-AC97-7A10ACA478E7}">
+      <dsp:nvSpPr>
+        <dsp:cNvPr id="0" name=""/>
+        <dsp:cNvSpPr/>
+      </dsp:nvSpPr>
+      <dsp:spPr>
+        <a:xfrm>
+          <a:off x="6773137" y="2380109"/>
+          <a:ext cx="1777537" cy="559225"/>
+        </a:xfrm>
+        <a:prstGeom prst="wedgeRectCallout">
+          <a:avLst>
+            <a:gd name="adj1" fmla="val 20250"/>
+            <a:gd name="adj2" fmla="val -60700"/>
+          </a:avLst>
+        </a:prstGeom>
+        <a:solidFill>
+          <a:schemeClr val="accent1">
+            <a:hueOff val="0"/>
+            <a:satOff val="0"/>
+            <a:lumOff val="0"/>
+            <a:alphaOff val="0"/>
+          </a:schemeClr>
+        </a:solidFill>
+        <a:ln w="19050" cap="rnd" cmpd="sng" algn="ctr">
+          <a:solidFill>
+            <a:schemeClr val="lt1">
+              <a:hueOff val="0"/>
+              <a:satOff val="0"/>
+              <a:lumOff val="0"/>
+              <a:alphaOff val="0"/>
+            </a:schemeClr>
+          </a:solidFill>
+          <a:prstDash val="solid"/>
+        </a:ln>
+        <a:effectLst/>
+      </dsp:spPr>
+      <dsp:style>
+        <a:lnRef idx="2">
+          <a:scrgbClr r="0" g="0" b="0"/>
+        </a:lnRef>
+        <a:fillRef idx="1">
+          <a:scrgbClr r="0" g="0" b="0"/>
+        </a:fillRef>
+        <a:effectRef idx="0">
+          <a:scrgbClr r="0" g="0" b="0"/>
+        </a:effectRef>
+        <a:fontRef idx="minor">
+          <a:schemeClr val="lt1"/>
+        </a:fontRef>
+      </dsp:style>
+      <dsp:txBody>
+        <a:bodyPr spcFirstLastPara="0" vert="horz" wrap="square" lIns="99060" tIns="99060" rIns="99060" bIns="99060" numCol="1" spcCol="1270" anchor="ctr" anchorCtr="0">
+          <a:noAutofit/>
+        </a:bodyPr>
+        <a:lstStyle/>
+        <a:p>
+          <a:pPr lvl="0" algn="ctr" defTabSz="1155700">
+            <a:lnSpc>
+              <a:spcPct val="90000"/>
+            </a:lnSpc>
+            <a:spcBef>
+              <a:spcPct val="0"/>
+            </a:spcBef>
+            <a:spcAft>
+              <a:spcPct val="35000"/>
+            </a:spcAft>
+          </a:pPr>
+          <a:r>
+            <a:rPr lang="en-US" sz="2600" kern="1200" dirty="0" smtClean="0"/>
+            <a:t>Share</a:t>
+          </a:r>
+          <a:endParaRPr lang="uk-UA" sz="2600" kern="1200" dirty="0"/>
+        </a:p>
+      </dsp:txBody>
+      <dsp:txXfrm>
+        <a:off x="6773137" y="2380109"/>
+        <a:ext cx="1777537" cy="559225"/>
+      </dsp:txXfrm>
+    </dsp:sp>
+  </dsp:spTree>
+</dsp:drawing>
+</file>
+
+<file path=ppt/diagrams/layout1.xml><?xml version="1.0" encoding="utf-8"?>
+<dgm:layoutDef xmlns:dgm="http://schemas.openxmlformats.org/drawingml/2006/diagram" xmlns:a="http://schemas.openxmlformats.org/drawingml/2006/main" uniqueId="urn:microsoft.com/office/officeart/2008/layout/BendingPictureCaptionList">
+  <dgm:title val=""/>
+  <dgm:desc val=""/>
+  <dgm:catLst>
+    <dgm:cat type="picture" pri="9000"/>
+    <dgm:cat type="pictureconvert" pri="9000"/>
+  </dgm:catLst>
+  <dgm:sampData>
+    <dgm:dataModel>
+      <dgm:ptLst>
+        <dgm:pt modelId="0" type="doc"/>
+        <dgm:pt modelId="10">
+          <dgm:prSet phldr="1"/>
+        </dgm:pt>
+        <dgm:pt modelId="20">
+          <dgm:prSet phldr="1"/>
+        </dgm:pt>
+        <dgm:pt modelId="30">
+          <dgm:prSet phldr="1"/>
+        </dgm:pt>
+      </dgm:ptLst>
+      <dgm:cxnLst>
+        <dgm:cxn modelId="60" srcId="0" destId="10" srcOrd="0" destOrd="0"/>
+        <dgm:cxn modelId="70" srcId="0" destId="20" srcOrd="1" destOrd="0"/>
+        <dgm:cxn modelId="80" srcId="0" destId="30" srcOrd="2" destOrd="0"/>
+      </dgm:cxnLst>
+      <dgm:bg/>
+      <dgm:whole/>
+    </dgm:dataModel>
+  </dgm:sampData>
+  <dgm:styleData>
+    <dgm:dataModel>
+      <dgm:ptLst>
+        <dgm:pt modelId="0" type="doc"/>
+        <dgm:pt modelId="10">
+          <dgm:prSet phldr="1"/>
+        </dgm:pt>
+        <dgm:pt modelId="20">
+          <dgm:prSet phldr="1"/>
+        </dgm:pt>
+      </dgm:ptLst>
+      <dgm:cxnLst>
+        <dgm:cxn modelId="60" srcId="0" destId="10" srcOrd="0" destOrd="0"/>
+        <dgm:cxn modelId="70" srcId="0" destId="20" srcOrd="1" destOrd="0"/>
+      </dgm:cxnLst>
+      <dgm:bg/>
+      <dgm:whole/>
+    </dgm:dataModel>
+  </dgm:styleData>
+  <dgm:clrData>
+    <dgm:dataModel>
+      <dgm:ptLst>
+        <dgm:pt modelId="0" type="doc"/>
+        <dgm:pt modelId="10">
+          <dgm:prSet phldr="1"/>
+        </dgm:pt>
+        <dgm:pt modelId="20">
+          <dgm:prSet phldr="1"/>
+        </dgm:pt>
+        <dgm:pt modelId="30">
+          <dgm:prSet phldr="1"/>
+        </dgm:pt>
+        <dgm:pt modelId="40">
+          <dgm:prSet phldr="1"/>
+        </dgm:pt>
+      </dgm:ptLst>
+      <dgm:cxnLst>
+        <dgm:cxn modelId="60" srcId="0" destId="10" srcOrd="0" destOrd="0"/>
+        <dgm:cxn modelId="70" srcId="0" destId="20" srcOrd="1" destOrd="0"/>
+        <dgm:cxn modelId="80" srcId="0" destId="30" srcOrd="2" destOrd="0"/>
+        <dgm:cxn modelId="90" srcId="0" destId="40" srcOrd="3" destOrd="0"/>
+      </dgm:cxnLst>
+      <dgm:bg/>
+      <dgm:whole/>
+    </dgm:dataModel>
+  </dgm:clrData>
+  <dgm:layoutNode name="Name0">
+    <dgm:varLst>
+      <dgm:dir/>
+      <dgm:resizeHandles val="exact"/>
+    </dgm:varLst>
+    <dgm:choose name="Name1">
+      <dgm:if name="Name2" func="var" arg="dir" op="equ" val="norm">
+        <dgm:alg type="snake">
+          <dgm:param type="off" val="ctr"/>
+        </dgm:alg>
+      </dgm:if>
+      <dgm:else name="Name3">
+        <dgm:alg type="snake">
+          <dgm:param type="off" val="ctr"/>
+          <dgm:param type="grDir" val="tR"/>
+        </dgm:alg>
+      </dgm:else>
+    </dgm:choose>
+    <dgm:shape xmlns:r="http://schemas.openxmlformats.org/officeDocument/2006/relationships" r:blip="">
+      <dgm:adjLst/>
+    </dgm:shape>
+    <dgm:constrLst>
+      <dgm:constr type="primFontSz" for="des" ptType="node" op="equ" val="65"/>
+      <dgm:constr type="w" for="ch" forName="composite" refType="w"/>
+      <dgm:constr type="h" for="ch" forName="composite" refType="w" fact="1.11"/>
+      <dgm:constr type="sp" refType="w" refFor="ch" refForName="composite" op="equ" fact="0.1"/>
+      <dgm:constr type="w" for="ch" forName="sibTrans" refType="w" refFor="ch" refForName="composite" op="equ" fact="0.1"/>
+      <dgm:constr type="h" for="ch" forName="sibTrans" refType="w" refFor="ch" refForName="sibTrans" op="equ"/>
+    </dgm:constrLst>
+    <dgm:forEach name="nodesForEach" axis="ch" ptType="node">
+      <dgm:layoutNode name="composite">
+        <dgm:alg type="composite">
+          <dgm:param type="ar" val="1"/>
+        </dgm:alg>
+        <dgm:shape xmlns:r="http://schemas.openxmlformats.org/officeDocument/2006/relationships" r:blip="">
+          <dgm:adjLst/>
+        </dgm:shape>
+        <dgm:choose name="Name4">
+          <dgm:if name="Name5" func="var" arg="dir" op="equ" val="norm">
+            <dgm:constrLst>
+              <dgm:constr type="l" for="ch" forName="rect1" refType="w" fact="0"/>
+              <dgm:constr type="t" for="ch" forName="rect1" refType="h" fact="0"/>
+              <dgm:constr type="w" for="ch" forName="rect1" refType="w"/>
+              <dgm:constr type="h" for="ch" forName="rect1" refType="h" fact="0.8"/>
+              <dgm:constr type="l" for="ch" forName="wedgeRectCallout1" refType="w" fact="0.09"/>
+              <dgm:constr type="t" for="ch" forName="wedgeRectCallout1" refType="h" fact="0.72"/>
+              <dgm:constr type="w" for="ch" forName="wedgeRectCallout1" refType="w" fact="0.89"/>
+              <dgm:constr type="h" for="ch" forName="wedgeRectCallout1" refType="h" fact="0.28"/>
+            </dgm:constrLst>
+          </dgm:if>
+          <dgm:else name="Name6">
+            <dgm:constrLst>
+              <dgm:constr type="l" for="ch" forName="rect1" refType="w" fact="0"/>
+              <dgm:constr type="t" for="ch" forName="rect1" refType="h" fact="0"/>
+              <dgm:constr type="w" for="ch" forName="rect1" refType="w"/>
+              <dgm:constr type="h" for="ch" forName="rect1" refType="h" fact="0.8"/>
+              <dgm:constr type="l" for="ch" forName="wedgeRectCallout1" refType="w" fact="0.02"/>
+              <dgm:constr type="t" for="ch" forName="wedgeRectCallout1" refType="h" fact="0.72"/>
+              <dgm:constr type="w" for="ch" forName="wedgeRectCallout1" refType="w" fact="0.89"/>
+              <dgm:constr type="h" for="ch" forName="wedgeRectCallout1" refType="h" fact="0.28"/>
+            </dgm:constrLst>
+          </dgm:else>
+        </dgm:choose>
+        <dgm:layoutNode name="rect1" styleLbl="bgImgPlace1">
+          <dgm:alg type="sp"/>
+          <dgm:shape xmlns:r="http://schemas.openxmlformats.org/officeDocument/2006/relationships" type="rect" r:blip="" blipPhldr="1">
+            <dgm:adjLst/>
+          </dgm:shape>
+          <dgm:presOf/>
+        </dgm:layoutNode>
+        <dgm:layoutNode name="wedgeRectCallout1" styleLbl="node1">
+          <dgm:varLst>
+            <dgm:bulletEnabled val="1"/>
+          </dgm:varLst>
+          <dgm:alg type="tx"/>
+          <dgm:choose name="Name7">
+            <dgm:if name="Name8" func="var" arg="dir" op="equ" val="norm">
+              <dgm:shape xmlns:r="http://schemas.openxmlformats.org/officeDocument/2006/relationships" type="wedgeRectCallout" r:blip="">
+                <dgm:adjLst>
+                  <dgm:adj idx="1" val="0.2025"/>
+                  <dgm:adj idx="2" val="-0.607"/>
+                </dgm:adjLst>
+              </dgm:shape>
+            </dgm:if>
+            <dgm:else name="Name9">
+              <dgm:shape xmlns:r="http://schemas.openxmlformats.org/officeDocument/2006/relationships" type="wedgeRectCallout" r:blip="">
+                <dgm:adjLst>
+                  <dgm:adj idx="1" val="-0.2025"/>
+                  <dgm:adj idx="2" val="-0.607"/>
+                </dgm:adjLst>
+              </dgm:shape>
+            </dgm:else>
+          </dgm:choose>
+          <dgm:presOf axis="desOrSelf" ptType="node"/>
+          <dgm:constrLst>
+            <dgm:constr type="lMarg" refType="primFontSz" fact="0.3"/>
+            <dgm:constr type="rMarg" refType="primFontSz" fact="0.3"/>
+            <dgm:constr type="tMarg" refType="primFontSz" fact="0.3"/>
+            <dgm:constr type="bMarg" refType="primFontSz" fact="0.3"/>
+          </dgm:constrLst>
+          <dgm:ruleLst>
+            <dgm:rule type="primFontSz" val="5" fact="NaN" max="NaN"/>
+          </dgm:ruleLst>
+        </dgm:layoutNode>
+      </dgm:layoutNode>
+      <dgm:forEach name="sibTransForEach" axis="followSib" ptType="sibTrans" cnt="1">
+        <dgm:layoutNode name="sibTrans">
+          <dgm:alg type="sp"/>
+          <dgm:shape xmlns:r="http://schemas.openxmlformats.org/officeDocument/2006/relationships" r:blip="">
+            <dgm:adjLst/>
+          </dgm:shape>
+        </dgm:layoutNode>
+      </dgm:forEach>
+    </dgm:forEach>
+  </dgm:layoutNode>
+</dgm:layoutDef>
+</file>
+
+<file path=ppt/diagrams/quickStyle1.xml><?xml version="1.0" encoding="utf-8"?>
+<dgm:styleDef xmlns:dgm="http://schemas.openxmlformats.org/drawingml/2006/diagram" xmlns:a="http://schemas.openxmlformats.org/drawingml/2006/main" uniqueId="urn:microsoft.com/office/officeart/2005/8/quickstyle/simple1">
+  <dgm:title val=""/>
+  <dgm:desc val=""/>
+  <dgm:catLst>
+    <dgm:cat type="simple" pri="10100"/>
+  </dgm:catLst>
+  <dgm:scene3d>
+    <a:camera prst="orthographicFront"/>
+    <a:lightRig rig="threePt" dir="t"/>
+  </dgm:scene3d>
+  <dgm:styleLbl name="node0">
+    <dgm:scene3d>
+      <a:camera prst="orthographicFront"/>
+      <a:lightRig rig="threePt" dir="t"/>
+    </dgm:scene3d>
+    <dgm:sp3d/>
+    <dgm:txPr/>
+    <dgm:style>
+      <a:lnRef idx="2">
+        <a:scrgbClr r="0" g="0" b="0"/>
+      </a:lnRef>
+      <a:fillRef idx="1">
+        <a:scrgbClr r="0" g="0" b="0"/>
+      </a:fillRef>
+      <a:effectRef idx="0">
+        <a:scrgbClr r="0" g="0" b="0"/>
+      </a:effectRef>
+      <a:fontRef idx="minor">
+        <a:schemeClr val="lt1"/>
+      </a:fontRef>
+    </dgm:style>
+  </dgm:styleLbl>
+  <dgm:styleLbl name="lnNode1">
+    <dgm:scene3d>
+      <a:camera prst="orthographicFront"/>
+      <a:lightRig rig="threePt" dir="t"/>
+    </dgm:scene3d>
+    <dgm:sp3d/>
+    <dgm:txPr/>
+    <dgm:style>
+      <a:lnRef idx="2">
+        <a:scrgbClr r="0" g="0" b="0"/>
+      </a:lnRef>
+      <a:fillRef idx="1">
+        <a:scrgbClr r="0" g="0" b="0"/>
+      </a:fillRef>
+      <a:effectRef idx="0">
+        <a:scrgbClr r="0" g="0" b="0"/>
+      </a:effectRef>
+      <a:fontRef idx="minor">
+        <a:schemeClr val="lt1"/>
+      </a:fontRef>
+    </dgm:style>
+  </dgm:styleLbl>
+  <dgm:styleLbl name="vennNode1">
+    <dgm:scene3d>
+      <a:camera prst="orthographicFront"/>
+      <a:lightRig rig="threePt" dir="t"/>
+    </dgm:scene3d>
+    <dgm:sp3d/>
+    <dgm:txPr/>
+    <dgm:style>
+      <a:lnRef idx="2">
+        <a:scrgbClr r="0" g="0" b="0"/>
+      </a:lnRef>
+      <a:fillRef idx="1">
+        <a:scrgbClr r="0" g="0" b="0"/>
+      </a:fillRef>
+      <a:effectRef idx="0">
+        <a:scrgbClr r="0" g="0" b="0"/>
+      </a:effectRef>
+      <a:fontRef idx="minor">
+        <a:schemeClr val="tx1"/>
+      </a:fontRef>
+    </dgm:style>
+  </dgm:styleLbl>
+  <dgm:styleLbl name="alignNode1">
+    <dgm:scene3d>
+      <a:camera prst="orthographicFront"/>
+      <a:lightRig rig="threePt" dir="t"/>
+    </dgm:scene3d>
+    <dgm:sp3d/>
+    <dgm:txPr/>
+    <dgm:style>
+      <a:lnRef idx="2">
+        <a:scrgbClr r="0" g="0" b="0"/>
+      </a:lnRef>
+      <a:fillRef idx="1">
+        <a:scrgbClr r="0" g="0" b="0"/>
+      </a:fillRef>
+      <a:effectRef idx="0">
+        <a:scrgbClr r="0" g="0" b="0"/>
+      </a:effectRef>
+      <a:fontRef idx="minor">
+        <a:schemeClr val="lt1"/>
+      </a:fontRef>
+    </dgm:style>
+  </dgm:styleLbl>
+  <dgm:styleLbl name="node1">
+    <dgm:scene3d>
+      <a:camera prst="orthographicFront"/>
+      <a:lightRig rig="threePt" dir="t"/>
+    </dgm:scene3d>
+    <dgm:sp3d/>
+    <dgm:txPr/>
+    <dgm:style>
+      <a:lnRef idx="2">
+        <a:scrgbClr r="0" g="0" b="0"/>
+      </a:lnRef>
+      <a:fillRef idx="1">
+        <a:scrgbClr r="0" g="0" b="0"/>
+      </a:fillRef>
+      <a:effectRef idx="0">
+        <a:scrgbClr r="0" g="0" b="0"/>
+      </a:effectRef>
+      <a:fontRef idx="minor">
+        <a:schemeClr val="lt1"/>
+      </a:fontRef>
+    </dgm:style>
+  </dgm:styleLbl>
+  <dgm:styleLbl name="node2">
+    <dgm:scene3d>
+      <a:camera prst="orthographicFront"/>
+      <a:lightRig rig="threePt" dir="t"/>
+    </dgm:scene3d>
+    <dgm:sp3d/>
+    <dgm:txPr/>
+    <dgm:style>
+      <a:lnRef idx="2">
+        <a:scrgbClr r="0" g="0" b="0"/>
+      </a:lnRef>
+      <a:fillRef idx="1">
+        <a:scrgbClr r="0" g="0" b="0"/>
+      </a:fillRef>
+      <a:effectRef idx="0">
+        <a:scrgbClr r="0" g="0" b="0"/>
+      </a:effectRef>
+      <a:fontRef idx="minor">
+        <a:schemeClr val="lt1"/>
+      </a:fontRef>
+    </dgm:style>
+  </dgm:styleLbl>
+  <dgm:styleLbl name="node3">
+    <dgm:scene3d>
+      <a:camera prst="orthographicFront"/>
+      <a:lightRig rig="threePt" dir="t"/>
+    </dgm:scene3d>
+    <dgm:sp3d/>
+    <dgm:txPr/>
+    <dgm:style>
+      <a:lnRef idx="2">
+        <a:scrgbClr r="0" g="0" b="0"/>
+      </a:lnRef>
+      <a:fillRef idx="1">
+        <a:scrgbClr r="0" g="0" b="0"/>
+      </a:fillRef>
+      <a:effectRef idx="0">
+        <a:scrgbClr r="0" g="0" b="0"/>
+      </a:effectRef>
+      <a:fontRef idx="minor">
+        <a:schemeClr val="lt1"/>
+      </a:fontRef>
+    </dgm:style>
+  </dgm:styleLbl>
+  <dgm:styleLbl name="node4">
+    <dgm:scene3d>
+      <a:camera prst="orthographicFront"/>
+      <a:lightRig rig="threePt" dir="t"/>
+    </dgm:scene3d>
+    <dgm:sp3d/>
+    <dgm:txPr/>
+    <dgm:style>
+      <a:lnRef idx="2">
+        <a:scrgbClr r="0" g="0" b="0"/>
+      </a:lnRef>
+      <a:fillRef idx="1">
+        <a:scrgbClr r="0" g="0" b="0"/>
+      </a:fillRef>
+      <a:effectRef idx="0">
+        <a:scrgbClr r="0" g="0" b="0"/>
+      </a:effectRef>
+      <a:fontRef idx="minor">
+        <a:schemeClr val="lt1"/>
+      </a:fontRef>
+    </dgm:style>
+  </dgm:styleLbl>
+  <dgm:styleLbl name="fgImgPlace1">
+    <dgm:scene3d>
+      <a:camera prst="orthographicFront"/>
+      <a:lightRig rig="threePt" dir="t"/>
+    </dgm:scene3d>
+    <dgm:sp3d/>
+    <dgm:txPr/>
+    <dgm:style>
+      <a:lnRef idx="2">
+        <a:scrgbClr r="0" g="0" b="0"/>
+      </a:lnRef>
+      <a:fillRef idx="1">
+        <a:scrgbClr r="0" g="0" b="0"/>
+      </a:fillRef>
+      <a:effectRef idx="0">
+        <a:scrgbClr r="0" g="0" b="0"/>
+      </a:effectRef>
+      <a:fontRef idx="minor"/>
+    </dgm:style>
+  </dgm:styleLbl>
+  <dgm:styleLbl name="alignImgPlace1">
+    <dgm:scene3d>
+      <a:camera prst="orthographicFront"/>
+      <a:lightRig rig="threePt" dir="t"/>
+    </dgm:scene3d>
+    <dgm:sp3d/>
+    <dgm:txPr/>
+    <dgm:style>
+      <a:lnRef idx="2">
+        <a:scrgbClr r="0" g="0" b="0"/>
+      </a:lnRef>
+      <a:fillRef idx="1">
+        <a:scrgbClr r="0" g="0" b="0"/>
+      </a:fillRef>
+      <a:effectRef idx="0">
+        <a:scrgbClr r="0" g="0" b="0"/>
+      </a:effectRef>
+      <a:fontRef idx="minor"/>
+    </dgm:style>
+  </dgm:styleLbl>
+  <dgm:styleLbl name="bgImgPlace1">
+    <dgm:scene3d>
+      <a:camera prst="orthographicFront"/>
+      <a:lightRig rig="threePt" dir="t"/>
+    </dgm:scene3d>
+    <dgm:sp3d/>
+    <dgm:txPr/>
+    <dgm:style>
+      <a:lnRef idx="2">
+        <a:scrgbClr r="0" g="0" b="0"/>
+      </a:lnRef>
+      <a:fillRef idx="1">
+        <a:scrgbClr r="0" g="0" b="0"/>
+      </a:fillRef>
+      <a:effectRef idx="0">
+        <a:scrgbClr r="0" g="0" b="0"/>
+      </a:effectRef>
+      <a:fontRef idx="minor"/>
+    </dgm:style>
+  </dgm:styleLbl>
+  <dgm:styleLbl name="sibTrans2D1">
+    <dgm:scene3d>
+      <a:camera prst="orthographicFront"/>
+      <a:lightRig rig="threePt" dir="t"/>
+    </dgm:scene3d>
+    <dgm:sp3d/>
+    <dgm:txPr/>
+    <dgm:style>
+      <a:lnRef idx="0">
+        <a:scrgbClr r="0" g="0" b="0"/>
+      </a:lnRef>
+      <a:fillRef idx="1">
+        <a:scrgbClr r="0" g="0" b="0"/>
+      </a:fillRef>
+      <a:effectRef idx="0">
+        <a:scrgbClr r="0" g="0" b="0"/>
+      </a:effectRef>
+      <a:fontRef idx="minor">
+        <a:schemeClr val="lt1"/>
+      </a:fontRef>
+    </dgm:style>
+  </dgm:styleLbl>
+  <dgm:styleLbl name="fgSibTrans2D1">
+    <dgm:scene3d>
+      <a:camera prst="orthographicFront"/>
+      <a:lightRig rig="threePt" dir="t"/>
+    </dgm:scene3d>
+    <dgm:sp3d/>
+    <dgm:txPr/>
+    <dgm:style>
+      <a:lnRef idx="0">
+        <a:scrgbClr r="0" g="0" b="0"/>
+      </a:lnRef>
+      <a:fillRef idx="1">
+        <a:scrgbClr r="0" g="0" b="0"/>
+      </a:fillRef>
+      <a:effectRef idx="0">
+        <a:scrgbClr r="0" g="0" b="0"/>
+      </a:effectRef>
+      <a:fontRef idx="minor">
+        <a:schemeClr val="lt1"/>
+      </a:fontRef>
+    </dgm:style>
+  </dgm:styleLbl>
+  <dgm:styleLbl name="bgSibTrans2D1">
+    <dgm:scene3d>
+      <a:camera prst="orthographicFront"/>
+      <a:lightRig rig="threePt" dir="t"/>
+    </dgm:scene3d>
+    <dgm:sp3d/>
+    <dgm:txPr/>
+    <dgm:style>
+      <a:lnRef idx="0">
+        <a:scrgbClr r="0" g="0" b="0"/>
+      </a:lnRef>
+      <a:fillRef idx="1">
+        <a:scrgbClr r="0" g="0" b="0"/>
+      </a:fillRef>
+      <a:effectRef idx="0">
+        <a:scrgbClr r="0" g="0" b="0"/>
+      </a:effectRef>
+      <a:fontRef idx="minor">
+        <a:schemeClr val="lt1"/>
+      </a:fontRef>
+    </dgm:style>
+  </dgm:styleLbl>
+  <dgm:styleLbl name="sibTrans1D1">
+    <dgm:scene3d>
+      <a:camera prst="orthographicFront"/>
+      <a:lightRig rig="threePt" dir="t"/>
+    </dgm:scene3d>
+    <dgm:sp3d/>
+    <dgm:txPr/>
+    <dgm:style>
+      <a:lnRef idx="1">
+        <a:scrgbClr r="0" g="0" b="0"/>
+      </a:lnRef>
+      <a:fillRef idx="0">
+        <a:scrgbClr r="0" g="0" b="0"/>
+      </a:fillRef>
+      <a:effectRef idx="0">
+        <a:scrgbClr r="0" g="0" b="0"/>
+      </a:effectRef>
+      <a:fontRef idx="minor"/>
+    </dgm:style>
+  </dgm:styleLbl>
+  <dgm:styleLbl name="callout">
+    <dgm:scene3d>
+      <a:camera prst="orthographicFront"/>
+      <a:lightRig rig="threePt" dir="t"/>
+    </dgm:scene3d>
+    <dgm:sp3d/>
+    <dgm:txPr/>
+    <dgm:style>
+      <a:lnRef idx="2">
+        <a:scrgbClr r="0" g="0" b="0"/>
+      </a:lnRef>
+      <a:fillRef idx="1">
+        <a:scrgbClr r="0" g="0" b="0"/>
+      </a:fillRef>
+      <a:effectRef idx="0">
+        <a:scrgbClr r="0" g="0" b="0"/>
+      </a:effectRef>
+      <a:fontRef idx="minor"/>
+    </dgm:style>
+  </dgm:styleLbl>
+  <dgm:styleLbl name="asst0">
+    <dgm:scene3d>
+      <a:camera prst="orthographicFront"/>
+      <a:lightRig rig="threePt" dir="t"/>
+    </dgm:scene3d>
+    <dgm:sp3d/>
+    <dgm:txPr/>
+    <dgm:style>
+      <a:lnRef idx="2">
+        <a:scrgbClr r="0" g="0" b="0"/>
+      </a:lnRef>
+      <a:fillRef idx="1">
+        <a:scrgbClr r="0" g="0" b="0"/>
+      </a:fillRef>
+      <a:effectRef idx="0">
+        <a:scrgbClr r="0" g="0" b="0"/>
+      </a:effectRef>
+      <a:fontRef idx="minor">
+        <a:schemeClr val="lt1"/>
+      </a:fontRef>
+    </dgm:style>
+  </dgm:styleLbl>
+  <dgm:styleLbl name="asst1">
+    <dgm:scene3d>
+      <a:camera prst="orthographicFront"/>
+      <a:lightRig rig="threePt" dir="t"/>
+    </dgm:scene3d>
+    <dgm:sp3d/>
+    <dgm:txPr/>
+    <dgm:style>
+      <a:lnRef idx="2">
+        <a:scrgbClr r="0" g="0" b="0"/>
+      </a:lnRef>
+      <a:fillRef idx="1">
+        <a:scrgbClr r="0" g="0" b="0"/>
+      </a:fillRef>
+      <a:effectRef idx="0">
+        <a:scrgbClr r="0" g="0" b="0"/>
+      </a:effectRef>
+      <a:fontRef idx="minor">
+        <a:schemeClr val="lt1"/>
+      </a:fontRef>
+    </dgm:style>
+  </dgm:styleLbl>
+  <dgm:styleLbl name="asst2">
+    <dgm:scene3d>
+      <a:camera prst="orthographicFront"/>
+      <a:lightRig rig="threePt" dir="t"/>
+    </dgm:scene3d>
+    <dgm:sp3d/>
+    <dgm:txPr/>
+    <dgm:style>
+      <a:lnRef idx="2">
+        <a:scrgbClr r="0" g="0" b="0"/>
+      </a:lnRef>
+      <a:fillRef idx="1">
+        <a:scrgbClr r="0" g="0" b="0"/>
+      </a:fillRef>
+      <a:effectRef idx="0">
+        <a:scrgbClr r="0" g="0" b="0"/>
+      </a:effectRef>
+      <a:fontRef idx="minor">
+        <a:schemeClr val="lt1"/>
+      </a:fontRef>
+    </dgm:style>
+  </dgm:styleLbl>
+  <dgm:styleLbl name="asst3">
+    <dgm:scene3d>
+      <a:camera prst="orthographicFront"/>
+      <a:lightRig rig="threePt" dir="t"/>
+    </dgm:scene3d>
+    <dgm:sp3d/>
+    <dgm:txPr/>
+    <dgm:style>
+      <a:lnRef idx="2">
+        <a:scrgbClr r="0" g="0" b="0"/>
+      </a:lnRef>
+      <a:fillRef idx="1">
+        <a:scrgbClr r="0" g="0" b="0"/>
+      </a:fillRef>
+      <a:effectRef idx="0">
+        <a:scrgbClr r="0" g="0" b="0"/>
+      </a:effectRef>
+      <a:fontRef idx="minor">
+        <a:schemeClr val="lt1"/>
+      </a:fontRef>
+    </dgm:style>
+  </dgm:styleLbl>
+  <dgm:styleLbl name="asst4">
+    <dgm:scene3d>
+      <a:camera prst="orthographicFront"/>
+      <a:lightRig rig="threePt" dir="t"/>
+    </dgm:scene3d>
+    <dgm:sp3d/>
+    <dgm:txPr/>
+    <dgm:style>
+      <a:lnRef idx="2">
+        <a:scrgbClr r="0" g="0" b="0"/>
+      </a:lnRef>
+      <a:fillRef idx="1">
+        <a:scrgbClr r="0" g="0" b="0"/>
+      </a:fillRef>
+      <a:effectRef idx="0">
+        <a:scrgbClr r="0" g="0" b="0"/>
+      </a:effectRef>
+      <a:fontRef idx="minor">
+        <a:schemeClr val="lt1"/>
+      </a:fontRef>
+    </dgm:style>
+  </dgm:styleLbl>
+  <dgm:styleLbl name="parChTrans2D1">
+    <dgm:scene3d>
+      <a:camera prst="orthographicFront"/>
+      <a:lightRig rig="threePt" dir="t"/>
+    </dgm:scene3d>
+    <dgm:sp3d/>
+    <dgm:txPr/>
+    <dgm:style>
+      <a:lnRef idx="2">
+        <a:scrgbClr r="0" g="0" b="0"/>
+      </a:lnRef>
+      <a:fillRef idx="1">
+        <a:scrgbClr r="0" g="0" b="0"/>
+      </a:fillRef>
+      <a:effectRef idx="0">
+        <a:scrgbClr r="0" g="0" b="0"/>
+      </a:effectRef>
+      <a:fontRef idx="minor">
+        <a:schemeClr val="lt1"/>
+      </a:fontRef>
+    </dgm:style>
+  </dgm:styleLbl>
+  <dgm:styleLbl name="parChTrans2D2">
+    <dgm:scene3d>
+      <a:camera prst="orthographicFront"/>
+      <a:lightRig rig="threePt" dir="t"/>
+    </dgm:scene3d>
+    <dgm:sp3d/>
+    <dgm:txPr/>
+    <dgm:style>
+      <a:lnRef idx="2">
+        <a:scrgbClr r="0" g="0" b="0"/>
+      </a:lnRef>
+      <a:fillRef idx="1">
+        <a:scrgbClr r="0" g="0" b="0"/>
+      </a:fillRef>
+      <a:effectRef idx="0">
+        <a:scrgbClr r="0" g="0" b="0"/>
+      </a:effectRef>
+      <a:fontRef idx="minor">
+        <a:schemeClr val="lt1"/>
+      </a:fontRef>
+    </dgm:style>
+  </dgm:styleLbl>
+  <dgm:styleLbl name="parChTrans2D3">
+    <dgm:scene3d>
+      <a:camera prst="orthographicFront"/>
+      <a:lightRig rig="threePt" dir="t"/>
+    </dgm:scene3d>
+    <dgm:sp3d/>
+    <dgm:txPr/>
+    <dgm:style>
+      <a:lnRef idx="2">
+        <a:scrgbClr r="0" g="0" b="0"/>
+      </a:lnRef>
+      <a:fillRef idx="1">
+        <a:scrgbClr r="0" g="0" b="0"/>
+      </a:fillRef>
+      <a:effectRef idx="0">
+        <a:scrgbClr r="0" g="0" b="0"/>
+      </a:effectRef>
+      <a:fontRef idx="minor">
+        <a:schemeClr val="lt1"/>
+      </a:fontRef>
+    </dgm:style>
+  </dgm:styleLbl>
+  <dgm:styleLbl name="parChTrans2D4">
+    <dgm:scene3d>
+      <a:camera prst="orthographicFront"/>
+      <a:lightRig rig="threePt" dir="t"/>
+    </dgm:scene3d>
+    <dgm:sp3d/>
+    <dgm:txPr/>
+    <dgm:style>
+      <a:lnRef idx="2">
+        <a:scrgbClr r="0" g="0" b="0"/>
+      </a:lnRef>
+      <a:fillRef idx="1">
+        <a:scrgbClr r="0" g="0" b="0"/>
+      </a:fillRef>
+      <a:effectRef idx="0">
+        <a:scrgbClr r="0" g="0" b="0"/>
+      </a:effectRef>
+      <a:fontRef idx="minor">
+        <a:schemeClr val="lt1"/>
+      </a:fontRef>
+    </dgm:style>
+  </dgm:styleLbl>
+  <dgm:styleLbl name="parChTrans1D1">
+    <dgm:scene3d>
+      <a:camera prst="orthographicFront"/>
+      <a:lightRig rig="threePt" dir="t"/>
+    </dgm:scene3d>
+    <dgm:sp3d/>
+    <dgm:txPr/>
+    <dgm:style>
+      <a:lnRef idx="2">
+        <a:scrgbClr r="0" g="0" b="0"/>
+      </a:lnRef>
+      <a:fillRef idx="0">
+        <a:scrgbClr r="0" g="0" b="0"/>
+      </a:fillRef>
+      <a:effectRef idx="0">
+        <a:scrgbClr r="0" g="0" b="0"/>
+      </a:effectRef>
+      <a:fontRef idx="minor"/>
+    </dgm:style>
+  </dgm:styleLbl>
+  <dgm:styleLbl name="parChTrans1D2">
+    <dgm:scene3d>
+      <a:camera prst="orthographicFront"/>
+      <a:lightRig rig="threePt" dir="t"/>
+    </dgm:scene3d>
+    <dgm:sp3d/>
+    <dgm:txPr/>
+    <dgm:style>
+      <a:lnRef idx="2">
+        <a:scrgbClr r="0" g="0" b="0"/>
+      </a:lnRef>
+      <a:fillRef idx="0">
+        <a:scrgbClr r="0" g="0" b="0"/>
+      </a:fillRef>
+      <a:effectRef idx="0">
+        <a:scrgbClr r="0" g="0" b="0"/>
+      </a:effectRef>
+      <a:fontRef idx="minor"/>
+    </dgm:style>
+  </dgm:styleLbl>
+  <dgm:styleLbl name="parChTrans1D3">
+    <dgm:scene3d>
+      <a:camera prst="orthographicFront"/>
+      <a:lightRig rig="threePt" dir="t"/>
+    </dgm:scene3d>
+    <dgm:sp3d/>
+    <dgm:txPr/>
+    <dgm:style>
+      <a:lnRef idx="2">
+        <a:scrgbClr r="0" g="0" b="0"/>
+      </a:lnRef>
+      <a:fillRef idx="0">
+        <a:scrgbClr r="0" g="0" b="0"/>
+      </a:fillRef>
+      <a:effectRef idx="0">
+        <a:scrgbClr r="0" g="0" b="0"/>
+      </a:effectRef>
+      <a:fontRef idx="minor"/>
+    </dgm:style>
+  </dgm:styleLbl>
+  <dgm:styleLbl name="parChTrans1D4">
+    <dgm:scene3d>
+      <a:camera prst="orthographicFront"/>
+      <a:lightRig rig="threePt" dir="t"/>
+    </dgm:scene3d>
+    <dgm:sp3d/>
+    <dgm:txPr/>
+    <dgm:style>
+      <a:lnRef idx="2">
+        <a:scrgbClr r="0" g="0" b="0"/>
+      </a:lnRef>
+      <a:fillRef idx="0">
+        <a:scrgbClr r="0" g="0" b="0"/>
+      </a:fillRef>
+      <a:effectRef idx="0">
+        <a:scrgbClr r="0" g="0" b="0"/>
+      </a:effectRef>
+      <a:fontRef idx="minor"/>
+    </dgm:style>
+  </dgm:styleLbl>
+  <dgm:styleLbl name="fgAcc1">
+    <dgm:scene3d>
+      <a:camera prst="orthographicFront"/>
+      <a:lightRig rig="threePt" dir="t"/>
+    </dgm:scene3d>
+    <dgm:sp3d/>
+    <dgm:txPr/>
+    <dgm:style>
+      <a:lnRef idx="2">
+        <a:scrgbClr r="0" g="0" b="0"/>
+      </a:lnRef>
+      <a:fillRef idx="1">
+        <a:scrgbClr r="0" g="0" b="0"/>
+      </a:fillRef>
+      <a:effectRef idx="0">
+        <a:scrgbClr r="0" g="0" b="0"/>
+      </a:effectRef>
+      <a:fontRef idx="minor"/>
+    </dgm:style>
+  </dgm:styleLbl>
+  <dgm:styleLbl name="conFgAcc1">
+    <dgm:scene3d>
+      <a:camera prst="orthographicFront"/>
+      <a:lightRig rig="threePt" dir="t"/>
+    </dgm:scene3d>
+    <dgm:sp3d/>
+    <dgm:txPr/>
+    <dgm:style>
+      <a:lnRef idx="2">
+        <a:scrgbClr r="0" g="0" b="0"/>
+      </a:lnRef>
+      <a:fillRef idx="1">
+        <a:scrgbClr r="0" g="0" b="0"/>
+      </a:fillRef>
+      <a:effectRef idx="0">
+        <a:scrgbClr r="0" g="0" b="0"/>
+      </a:effectRef>
+      <a:fontRef idx="minor"/>
+    </dgm:style>
+  </dgm:styleLbl>
+  <dgm:styleLbl name="alignAcc1">
+    <dgm:scene3d>
+      <a:camera prst="orthographicFront"/>
+      <a:lightRig rig="threePt" dir="t"/>
+    </dgm:scene3d>
+    <dgm:sp3d/>
+    <dgm:txPr/>
+    <dgm:style>
+      <a:lnRef idx="2">
+        <a:scrgbClr r="0" g="0" b="0"/>
+      </a:lnRef>
+      <a:fillRef idx="1">
+        <a:scrgbClr r="0" g="0" b="0"/>
+      </a:fillRef>
+      <a:effectRef idx="0">
+        <a:scrgbClr r="0" g="0" b="0"/>
+      </a:effectRef>
+      <a:fontRef idx="minor"/>
+    </dgm:style>
+  </dgm:styleLbl>
+  <dgm:styleLbl name="trAlignAcc1">
+    <dgm:scene3d>
+      <a:camera prst="orthographicFront"/>
+      <a:lightRig rig="threePt" dir="t"/>
+    </dgm:scene3d>
+    <dgm:sp3d/>
+    <dgm:txPr/>
+    <dgm:style>
+      <a:lnRef idx="1">
+        <a:scrgbClr r="0" g="0" b="0"/>
+      </a:lnRef>
+      <a:fillRef idx="1">
+        <a:scrgbClr r="0" g="0" b="0"/>
+      </a:fillRef>
+      <a:effectRef idx="0">
+        <a:scrgbClr r="0" g="0" b="0"/>
+      </a:effectRef>
+      <a:fontRef idx="minor"/>
+    </dgm:style>
+  </dgm:styleLbl>
+  <dgm:styleLbl name="bgAcc1">
+    <dgm:scene3d>
+      <a:camera prst="orthographicFront"/>
+      <a:lightRig rig="threePt" dir="t"/>
+    </dgm:scene3d>
+    <dgm:sp3d/>
+    <dgm:txPr/>
+    <dgm:style>
+      <a:lnRef idx="2">
+        <a:scrgbClr r="0" g="0" b="0"/>
+      </a:lnRef>
+      <a:fillRef idx="1">
+        <a:scrgbClr r="0" g="0" b="0"/>
+      </a:fillRef>
+      <a:effectRef idx="0">
+        <a:scrgbClr r="0" g="0" b="0"/>
+      </a:effectRef>
+      <a:fontRef idx="minor"/>
+    </dgm:style>
+  </dgm:styleLbl>
+  <dgm:styleLbl name="solidFgAcc1">
+    <dgm:scene3d>
+      <a:camera prst="orthographicFront"/>
+      <a:lightRig rig="threePt" dir="t"/>
+    </dgm:scene3d>
+    <dgm:sp3d/>
+    <dgm:txPr/>
+    <dgm:style>
+      <a:lnRef idx="2">
+        <a:scrgbClr r="0" g="0" b="0"/>
+      </a:lnRef>
+      <a:fillRef idx="1">
+        <a:scrgbClr r="0" g="0" b="0"/>
+      </a:fillRef>
+      <a:effectRef idx="0">
+        <a:scrgbClr r="0" g="0" b="0"/>
+      </a:effectRef>
+      <a:fontRef idx="minor"/>
+    </dgm:style>
+  </dgm:styleLbl>
+  <dgm:styleLbl name="solidAlignAcc1">
+    <dgm:scene3d>
+      <a:camera prst="orthographicFront"/>
+      <a:lightRig rig="threePt" dir="t"/>
+    </dgm:scene3d>
+    <dgm:sp3d/>
+    <dgm:txPr/>
+    <dgm:style>
+      <a:lnRef idx="2">
+        <a:scrgbClr r="0" g="0" b="0"/>
+      </a:lnRef>
+      <a:fillRef idx="1">
+        <a:scrgbClr r="0" g="0" b="0"/>
+      </a:fillRef>
+      <a:effectRef idx="0">
+        <a:scrgbClr r="0" g="0" b="0"/>
+      </a:effectRef>
+      <a:fontRef idx="minor"/>
+    </dgm:style>
+  </dgm:styleLbl>
+  <dgm:styleLbl name="solidBgAcc1">
+    <dgm:scene3d>
+      <a:camera prst="orthographicFront"/>
+      <a:lightRig rig="threePt" dir="t"/>
+    </dgm:scene3d>
+    <dgm:sp3d/>
+    <dgm:txPr/>
+    <dgm:style>
+      <a:lnRef idx="2">
+        <a:scrgbClr r="0" g="0" b="0"/>
+      </a:lnRef>
+      <a:fillRef idx="1">
+        <a:scrgbClr r="0" g="0" b="0"/>
+      </a:fillRef>
+      <a:effectRef idx="0">
+        <a:scrgbClr r="0" g="0" b="0"/>
+      </a:effectRef>
+      <a:fontRef idx="minor"/>
+    </dgm:style>
+  </dgm:styleLbl>
+  <dgm:styleLbl name="fgAccFollowNode1">
+    <dgm:scene3d>
+      <a:camera prst="orthographicFront"/>
+      <a:lightRig rig="threePt" dir="t"/>
+    </dgm:scene3d>
+    <dgm:sp3d/>
+    <dgm:txPr/>
+    <dgm:style>
+      <a:lnRef idx="2">
+        <a:scrgbClr r="0" g="0" b="0"/>
+      </a:lnRef>
+      <a:fillRef idx="1">
+        <a:scrgbClr r="0" g="0" b="0"/>
+      </a:fillRef>
+      <a:effectRef idx="0">
+        <a:scrgbClr r="0" g="0" b="0"/>
+      </a:effectRef>
+      <a:fontRef idx="minor"/>
+    </dgm:style>
+  </dgm:styleLbl>
+  <dgm:styleLbl name="alignAccFollowNode1">
+    <dgm:scene3d>
+      <a:camera prst="orthographicFront"/>
+      <a:lightRig rig="threePt" dir="t"/>
+    </dgm:scene3d>
+    <dgm:sp3d/>
+    <dgm:txPr/>
+    <dgm:style>
+      <a:lnRef idx="2">
+        <a:scrgbClr r="0" g="0" b="0"/>
+      </a:lnRef>
+      <a:fillRef idx="1">
+        <a:scrgbClr r="0" g="0" b="0"/>
+      </a:fillRef>
+      <a:effectRef idx="0">
+        <a:scrgbClr r="0" g="0" b="0"/>
+      </a:effectRef>
+      <a:fontRef idx="minor"/>
+    </dgm:style>
+  </dgm:styleLbl>
+  <dgm:styleLbl name="bgAccFollowNode1">
+    <dgm:scene3d>
+      <a:camera prst="orthographicFront"/>
+      <a:lightRig rig="threePt" dir="t"/>
+    </dgm:scene3d>
+    <dgm:sp3d/>
+    <dgm:txPr/>
+    <dgm:style>
+      <a:lnRef idx="2">
+        <a:scrgbClr r="0" g="0" b="0"/>
+      </a:lnRef>
+      <a:fillRef idx="1">
+        <a:scrgbClr r="0" g="0" b="0"/>
+      </a:fillRef>
+      <a:effectRef idx="0">
+        <a:scrgbClr r="0" g="0" b="0"/>
+      </a:effectRef>
+      <a:fontRef idx="minor"/>
+    </dgm:style>
+  </dgm:styleLbl>
+  <dgm:styleLbl name="fgAcc0">
+    <dgm:scene3d>
+      <a:camera prst="orthographicFront"/>
+      <a:lightRig rig="threePt" dir="t"/>
+    </dgm:scene3d>
+    <dgm:sp3d/>
+    <dgm:txPr/>
+    <dgm:style>
+      <a:lnRef idx="2">
+        <a:scrgbClr r="0" g="0" b="0"/>
+      </a:lnRef>
+      <a:fillRef idx="1">
+        <a:scrgbClr r="0" g="0" b="0"/>
+      </a:fillRef>
+      <a:effectRef idx="0">
+        <a:scrgbClr r="0" g="0" b="0"/>
+      </a:effectRef>
+      <a:fontRef idx="minor"/>
+    </dgm:style>
+  </dgm:styleLbl>
+  <dgm:styleLbl name="fgAcc2">
+    <dgm:scene3d>
+      <a:camera prst="orthographicFront"/>
+      <a:lightRig rig="threePt" dir="t"/>
+    </dgm:scene3d>
+    <dgm:sp3d/>
+    <dgm:txPr/>
+    <dgm:style>
+      <a:lnRef idx="2">
+        <a:scrgbClr r="0" g="0" b="0"/>
+      </a:lnRef>
+      <a:fillRef idx="1">
+        <a:scrgbClr r="0" g="0" b="0"/>
+      </a:fillRef>
+      <a:effectRef idx="0">
+        <a:scrgbClr r="0" g="0" b="0"/>
+      </a:effectRef>
+      <a:fontRef idx="minor"/>
+    </dgm:style>
+  </dgm:styleLbl>
+  <dgm:styleLbl name="fgAcc3">
+    <dgm:scene3d>
+      <a:camera prst="orthographicFront"/>
+      <a:lightRig rig="threePt" dir="t"/>
+    </dgm:scene3d>
+    <dgm:sp3d/>
+    <dgm:txPr/>
+    <dgm:style>
+      <a:lnRef idx="2">
+        <a:scrgbClr r="0" g="0" b="0"/>
+      </a:lnRef>
+      <a:fillRef idx="1">
+        <a:scrgbClr r="0" g="0" b="0"/>
+      </a:fillRef>
+      <a:effectRef idx="0">
+        <a:scrgbClr r="0" g="0" b="0"/>
+      </a:effectRef>
+      <a:fontRef idx="minor"/>
+    </dgm:style>
+  </dgm:styleLbl>
+  <dgm:styleLbl name="fgAcc4">
+    <dgm:scene3d>
+      <a:camera prst="orthographicFront"/>
+      <a:lightRig rig="threePt" dir="t"/>
+    </dgm:scene3d>
+    <dgm:sp3d/>
+    <dgm:txPr/>
+    <dgm:style>
+      <a:lnRef idx="2">
+        <a:scrgbClr r="0" g="0" b="0"/>
+      </a:lnRef>
+      <a:fillRef idx="1">
+        <a:scrgbClr r="0" g="0" b="0"/>
+      </a:fillRef>
+      <a:effectRef idx="0">
+        <a:scrgbClr r="0" g="0" b="0"/>
+      </a:effectRef>
+      <a:fontRef idx="minor"/>
+    </dgm:style>
+  </dgm:styleLbl>
+  <dgm:styleLbl name="bgShp">
+    <dgm:scene3d>
+      <a:camera prst="orthographicFront"/>
+      <a:lightRig rig="threePt" dir="t"/>
+    </dgm:scene3d>
+    <dgm:sp3d/>
+    <dgm:txPr/>
+    <dgm:style>
+      <a:lnRef idx="0">
+        <a:scrgbClr r="0" g="0" b="0"/>
+      </a:lnRef>
+      <a:fillRef idx="1">
+        <a:scrgbClr r="0" g="0" b="0"/>
+      </a:fillRef>
+      <a:effectRef idx="0">
+        <a:scrgbClr r="0" g="0" b="0"/>
+      </a:effectRef>
+      <a:fontRef idx="minor"/>
+    </dgm:style>
+  </dgm:styleLbl>
+  <dgm:styleLbl name="dkBgShp">
+    <dgm:scene3d>
+      <a:camera prst="orthographicFront"/>
+      <a:lightRig rig="threePt" dir="t"/>
+    </dgm:scene3d>
+    <dgm:sp3d/>
+    <dgm:txPr/>
+    <dgm:style>
+      <a:lnRef idx="0">
+        <a:scrgbClr r="0" g="0" b="0"/>
+      </a:lnRef>
+      <a:fillRef idx="1">
+        <a:scrgbClr r="0" g="0" b="0"/>
+      </a:fillRef>
+      <a:effectRef idx="0">
+        <a:scrgbClr r="0" g="0" b="0"/>
+      </a:effectRef>
+      <a:fontRef idx="minor"/>
+    </dgm:style>
+  </dgm:styleLbl>
+  <dgm:styleLbl name="trBgShp">
+    <dgm:scene3d>
+      <a:camera prst="orthographicFront"/>
+      <a:lightRig rig="threePt" dir="t"/>
+    </dgm:scene3d>
+    <dgm:sp3d/>
+    <dgm:txPr/>
+    <dgm:style>
+      <a:lnRef idx="0">
+        <a:scrgbClr r="0" g="0" b="0"/>
+      </a:lnRef>
+      <a:fillRef idx="1">
+        <a:scrgbClr r="0" g="0" b="0"/>
+      </a:fillRef>
+      <a:effectRef idx="0">
+        <a:scrgbClr r="0" g="0" b="0"/>
+      </a:effectRef>
+      <a:fontRef idx="minor"/>
+    </dgm:style>
+  </dgm:styleLbl>
+  <dgm:styleLbl name="fgShp">
+    <dgm:scene3d>
+      <a:camera prst="orthographicFront"/>
+      <a:lightRig rig="threePt" dir="t"/>
+    </dgm:scene3d>
+    <dgm:sp3d/>
+    <dgm:txPr/>
+    <dgm:style>
+      <a:lnRef idx="2">
+        <a:scrgbClr r="0" g="0" b="0"/>
+      </a:lnRef>
+      <a:fillRef idx="1">
+        <a:scrgbClr r="0" g="0" b="0"/>
+      </a:fillRef>
+      <a:effectRef idx="0">
+        <a:scrgbClr r="0" g="0" b="0"/>
+      </a:effectRef>
+      <a:fontRef idx="minor"/>
+    </dgm:style>
+  </dgm:styleLbl>
+  <dgm:styleLbl name="revTx">
+    <dgm:scene3d>
+      <a:camera prst="orthographicFront"/>
+      <a:lightRig rig="threePt" dir="t"/>
+    </dgm:scene3d>
+    <dgm:sp3d/>
+    <dgm:txPr/>
+    <dgm:style>
+      <a:lnRef idx="0">
+        <a:scrgbClr r="0" g="0" b="0"/>
+      </a:lnRef>
+      <a:fillRef idx="0">
+        <a:scrgbClr r="0" g="0" b="0"/>
+      </a:fillRef>
+      <a:effectRef idx="0">
+        <a:scrgbClr r="0" g="0" b="0"/>
+      </a:effectRef>
+      <a:fontRef idx="minor"/>
+    </dgm:style>
+  </dgm:styleLbl>
+</dgm:styleDef>
+</file>
+
 <file path=ppt/handoutMasters/handoutMaster1.xml><?xml version="1.0" encoding="utf-8"?>
 <p:handoutMaster xmlns:a="http://schemas.openxmlformats.org/drawingml/2006/main" xmlns:r="http://schemas.openxmlformats.org/officeDocument/2006/relationships" xmlns:p="http://schemas.openxmlformats.org/presentationml/2006/main">
   <p:cSld>
@@ -223,7 +3143,7 @@
           <a:p>
             <a:fld id="{59088EAF-6ECA-4616-85EF-35AA19C641F3}" type="datetimeFigureOut">
               <a:rPr lang="en-US"/>
-              <a:t>2/4/2015</a:t>
+              <a:t>2/5/2015</a:t>
             </a:fld>
             <a:endParaRPr/>
           </a:p>
@@ -388,7 +3308,7 @@
           <a:p>
             <a:fld id="{3ABD2D7A-D230-4F91-BD59-0A39C2703BA8}" type="datetimeFigureOut">
               <a:rPr lang="en-US"/>
-              <a:t>2/4/2015</a:t>
+              <a:t>2/5/2015</a:t>
             </a:fld>
             <a:endParaRPr/>
           </a:p>
@@ -1400,7 +4320,7 @@
           <a:p>
             <a:fld id="{F7AFFB9B-9FB8-469E-96F9-4D32314110B6}" type="datetimeFigureOut">
               <a:rPr lang="en-US" smtClean="0"/>
-              <a:t>2/4/2015</a:t>
+              <a:t>2/5/2015</a:t>
             </a:fld>
             <a:endParaRPr lang="en-US" dirty="0"/>
           </a:p>
@@ -1672,7 +4592,7 @@
             <a:fld id="{03F41C87-7AD9-4845-A077-840E4A0F3F06}" type="datetimeFigureOut">
               <a:rPr lang="en-US" smtClean="0"/>
               <a:pPr/>
-              <a:t>2/4/2015</a:t>
+              <a:t>2/5/2015</a:t>
             </a:fld>
             <a:endParaRPr lang="en-US"/>
           </a:p>
@@ -1995,7 +4915,7 @@
             <a:fld id="{03F41C87-7AD9-4845-A077-840E4A0F3F06}" type="datetimeFigureOut">
               <a:rPr lang="en-US" smtClean="0"/>
               <a:pPr/>
-              <a:t>2/4/2015</a:t>
+              <a:t>2/5/2015</a:t>
             </a:fld>
             <a:endParaRPr lang="en-US"/>
           </a:p>
@@ -2337,7 +5257,7 @@
             <a:fld id="{03F41C87-7AD9-4845-A077-840E4A0F3F06}" type="datetimeFigureOut">
               <a:rPr lang="en-US" smtClean="0"/>
               <a:pPr/>
-              <a:t>2/4/2015</a:t>
+              <a:t>2/5/2015</a:t>
             </a:fld>
             <a:endParaRPr lang="en-US"/>
           </a:p>
@@ -2660,7 +5580,7 @@
             <a:fld id="{03F41C87-7AD9-4845-A077-840E4A0F3F06}" type="datetimeFigureOut">
               <a:rPr lang="en-US" smtClean="0"/>
               <a:pPr/>
-              <a:t>2/4/2015</a:t>
+              <a:t>2/5/2015</a:t>
             </a:fld>
             <a:endParaRPr lang="en-US"/>
           </a:p>
@@ -3062,7 +5982,7 @@
             <a:fld id="{03F41C87-7AD9-4845-A077-840E4A0F3F06}" type="datetimeFigureOut">
               <a:rPr lang="en-US" smtClean="0"/>
               <a:pPr/>
-              <a:t>2/4/2015</a:t>
+              <a:t>2/5/2015</a:t>
             </a:fld>
             <a:endParaRPr lang="en-US"/>
           </a:p>
@@ -3240,7 +6160,7 @@
           <a:p>
             <a:fld id="{03F41C87-7AD9-4845-A077-840E4A0F3F06}" type="datetimeFigureOut">
               <a:rPr lang="en-US" smtClean="0"/>
-              <a:t>2/4/2015</a:t>
+              <a:t>2/5/2015</a:t>
             </a:fld>
             <a:endParaRPr lang="en-US"/>
           </a:p>
@@ -3439,7 +6359,7 @@
           <a:p>
             <a:fld id="{03F41C87-7AD9-4845-A077-840E4A0F3F06}" type="datetimeFigureOut">
               <a:rPr lang="en-US" smtClean="0"/>
-              <a:t>2/4/2015</a:t>
+              <a:t>2/5/2015</a:t>
             </a:fld>
             <a:endParaRPr lang="en-US"/>
           </a:p>
@@ -3628,7 +6548,7 @@
           <a:p>
             <a:fld id="{03F41C87-7AD9-4845-A077-840E4A0F3F06}" type="datetimeFigureOut">
               <a:rPr lang="en-US" smtClean="0"/>
-              <a:t>2/4/2015</a:t>
+              <a:t>2/5/2015</a:t>
             </a:fld>
             <a:endParaRPr lang="en-US"/>
           </a:p>
@@ -3894,7 +6814,7 @@
           <a:p>
             <a:fld id="{03F41C87-7AD9-4845-A077-840E4A0F3F06}" type="datetimeFigureOut">
               <a:rPr lang="en-US" smtClean="0"/>
-              <a:t>2/4/2015</a:t>
+              <a:t>2/5/2015</a:t>
             </a:fld>
             <a:endParaRPr lang="en-US"/>
           </a:p>
@@ -4145,7 +7065,7 @@
           <a:p>
             <a:fld id="{03F41C87-7AD9-4845-A077-840E4A0F3F06}" type="datetimeFigureOut">
               <a:rPr lang="en-US" smtClean="0"/>
-              <a:t>2/4/2015</a:t>
+              <a:t>2/5/2015</a:t>
             </a:fld>
             <a:endParaRPr lang="en-US"/>
           </a:p>
@@ -4538,7 +7458,7 @@
           <a:p>
             <a:fld id="{03F41C87-7AD9-4845-A077-840E4A0F3F06}" type="datetimeFigureOut">
               <a:rPr lang="en-US" smtClean="0"/>
-              <a:t>2/4/2015</a:t>
+              <a:t>2/5/2015</a:t>
             </a:fld>
             <a:endParaRPr lang="en-US"/>
           </a:p>
@@ -4680,7 +7600,7 @@
           <a:p>
             <a:fld id="{03F41C87-7AD9-4845-A077-840E4A0F3F06}" type="datetimeFigureOut">
               <a:rPr lang="en-US" smtClean="0"/>
-              <a:t>2/4/2015</a:t>
+              <a:t>2/5/2015</a:t>
             </a:fld>
             <a:endParaRPr lang="en-US"/>
           </a:p>
@@ -4794,7 +7714,7 @@
           <a:p>
             <a:fld id="{03F41C87-7AD9-4845-A077-840E4A0F3F06}" type="datetimeFigureOut">
               <a:rPr lang="en-US" smtClean="0"/>
-              <a:t>2/4/2015</a:t>
+              <a:t>2/5/2015</a:t>
             </a:fld>
             <a:endParaRPr lang="en-US"/>
           </a:p>
@@ -5068,7 +7988,7 @@
           <a:p>
             <a:fld id="{03F41C87-7AD9-4845-A077-840E4A0F3F06}" type="datetimeFigureOut">
               <a:rPr lang="en-US" smtClean="0"/>
-              <a:t>2/4/2015</a:t>
+              <a:t>2/5/2015</a:t>
             </a:fld>
             <a:endParaRPr lang="en-US"/>
           </a:p>
@@ -5394,7 +8314,7 @@
             <a:fld id="{03F41C87-7AD9-4845-A077-840E4A0F3F06}" type="datetimeFigureOut">
               <a:rPr lang="en-US" smtClean="0"/>
               <a:pPr/>
-              <a:t>2/4/2015</a:t>
+              <a:t>2/5/2015</a:t>
             </a:fld>
             <a:endParaRPr lang="en-US"/>
           </a:p>
@@ -6116,7 +9036,7 @@
             <a:fld id="{03F41C87-7AD9-4845-A077-840E4A0F3F06}" type="datetimeFigureOut">
               <a:rPr lang="en-US" smtClean="0"/>
               <a:pPr/>
-              <a:t>2/4/2015</a:t>
+              <a:t>2/5/2015</a:t>
             </a:fld>
             <a:endParaRPr lang="en-US"/>
           </a:p>
@@ -6953,13 +9873,13 @@
   <p:clrMapOvr>
     <a:masterClrMapping/>
   </p:clrMapOvr>
-  <mc:AlternateContent xmlns:mc="http://schemas.openxmlformats.org/markup-compatibility/2006">
-    <mc:Choice xmlns:p14="http://schemas.microsoft.com/office/powerpoint/2010/main" Requires="p14">
+  <mc:AlternateContent xmlns:mc="http://schemas.openxmlformats.org/markup-compatibility/2006" xmlns:p14="http://schemas.microsoft.com/office/powerpoint/2010/main">
+    <mc:Choice Requires="p14">
       <p:transition spd="med" p14:dur="700">
         <p:fade/>
       </p:transition>
     </mc:Choice>
-    <mc:Fallback>
+    <mc:Fallback xmlns="">
       <p:transition spd="med">
         <p:fade/>
       </p:transition>
@@ -7127,13 +10047,13 @@
   <p:clrMapOvr>
     <a:masterClrMapping/>
   </p:clrMapOvr>
-  <mc:AlternateContent xmlns:mc="http://schemas.openxmlformats.org/markup-compatibility/2006">
-    <mc:Choice xmlns:p14="http://schemas.microsoft.com/office/powerpoint/2010/main" Requires="p14">
+  <mc:AlternateContent xmlns:mc="http://schemas.openxmlformats.org/markup-compatibility/2006" xmlns:p14="http://schemas.microsoft.com/office/powerpoint/2010/main">
+    <mc:Choice Requires="p14">
       <p:transition spd="med" p14:dur="700">
         <p:fade/>
       </p:transition>
     </mc:Choice>
-    <mc:Fallback>
+    <mc:Fallback xmlns="">
       <p:transition spd="med">
         <p:fade/>
       </p:transition>
@@ -7593,13 +10513,13 @@
   <p:clrMapOvr>
     <a:masterClrMapping/>
   </p:clrMapOvr>
-  <mc:AlternateContent xmlns:mc="http://schemas.openxmlformats.org/markup-compatibility/2006">
-    <mc:Choice xmlns:p14="http://schemas.microsoft.com/office/powerpoint/2010/main" Requires="p14">
+  <mc:AlternateContent xmlns:mc="http://schemas.openxmlformats.org/markup-compatibility/2006" xmlns:p14="http://schemas.microsoft.com/office/powerpoint/2010/main">
+    <mc:Choice Requires="p14">
       <p:transition spd="med" p14:dur="700">
         <p:fade/>
       </p:transition>
     </mc:Choice>
-    <mc:Fallback>
+    <mc:Fallback xmlns="">
       <p:transition spd="med">
         <p:fade/>
       </p:transition>
@@ -8342,13 +11262,13 @@
   <p:clrMapOvr>
     <a:masterClrMapping/>
   </p:clrMapOvr>
-  <mc:AlternateContent xmlns:mc="http://schemas.openxmlformats.org/markup-compatibility/2006">
-    <mc:Choice xmlns:p14="http://schemas.microsoft.com/office/powerpoint/2010/main" Requires="p14">
+  <mc:AlternateContent xmlns:mc="http://schemas.openxmlformats.org/markup-compatibility/2006" xmlns:p14="http://schemas.microsoft.com/office/powerpoint/2010/main">
+    <mc:Choice Requires="p14">
       <p:transition spd="med" p14:dur="700">
         <p:fade/>
       </p:transition>
     </mc:Choice>
-    <mc:Fallback>
+    <mc:Fallback xmlns="">
       <p:transition spd="med">
         <p:fade/>
       </p:transition>
@@ -8443,13 +11363,13 @@
   <p:clrMapOvr>
     <a:masterClrMapping/>
   </p:clrMapOvr>
-  <mc:AlternateContent xmlns:mc="http://schemas.openxmlformats.org/markup-compatibility/2006">
-    <mc:Choice xmlns:p14="http://schemas.microsoft.com/office/powerpoint/2010/main" Requires="p14">
+  <mc:AlternateContent xmlns:mc="http://schemas.openxmlformats.org/markup-compatibility/2006" xmlns:p14="http://schemas.microsoft.com/office/powerpoint/2010/main">
+    <mc:Choice Requires="p14">
       <p:transition spd="med" p14:dur="700">
         <p:fade/>
       </p:transition>
     </mc:Choice>
-    <mc:Fallback>
+    <mc:Fallback xmlns="">
       <p:transition spd="med">
         <p:fade/>
       </p:transition>
@@ -8613,13 +11533,13 @@
   <p:clrMapOvr>
     <a:masterClrMapping/>
   </p:clrMapOvr>
-  <mc:AlternateContent xmlns:mc="http://schemas.openxmlformats.org/markup-compatibility/2006">
-    <mc:Choice xmlns:p14="http://schemas.microsoft.com/office/powerpoint/2010/main" Requires="p14">
+  <mc:AlternateContent xmlns:mc="http://schemas.openxmlformats.org/markup-compatibility/2006" xmlns:p14="http://schemas.microsoft.com/office/powerpoint/2010/main">
+    <mc:Choice Requires="p14">
       <p:transition spd="med" p14:dur="700">
         <p:fade/>
       </p:transition>
     </mc:Choice>
-    <mc:Fallback>
+    <mc:Fallback xmlns="">
       <p:transition spd="med">
         <p:fade/>
       </p:transition>
@@ -8631,6 +11551,522 @@
         <p:cTn id="1" dur="indefinite" restart="never" nodeType="tmRoot"/>
       </p:par>
     </p:tnLst>
+  </p:timing>
+</p:sld>
+</file>
+
+<file path=ppt/slides/slide8.xml><?xml version="1.0" encoding="utf-8"?>
+<p:sld xmlns:a="http://schemas.openxmlformats.org/drawingml/2006/main" xmlns:r="http://schemas.openxmlformats.org/officeDocument/2006/relationships" xmlns:p="http://schemas.openxmlformats.org/presentationml/2006/main">
+  <p:cSld>
+    <p:spTree>
+      <p:nvGrpSpPr>
+        <p:cNvPr id="1" name=""/>
+        <p:cNvGrpSpPr/>
+        <p:nvPr/>
+      </p:nvGrpSpPr>
+      <p:grpSpPr>
+        <a:xfrm>
+          <a:off x="0" y="0"/>
+          <a:ext cx="0" cy="0"/>
+          <a:chOff x="0" y="0"/>
+          <a:chExt cx="0" cy="0"/>
+        </a:xfrm>
+      </p:grpSpPr>
+      <p:sp>
+        <p:nvSpPr>
+          <p:cNvPr id="5" name="Title 4"/>
+          <p:cNvSpPr>
+            <a:spLocks noGrp="1"/>
+          </p:cNvSpPr>
+          <p:nvPr>
+            <p:ph type="title"/>
+          </p:nvPr>
+        </p:nvSpPr>
+        <p:spPr/>
+        <p:txBody>
+          <a:bodyPr/>
+          <a:lstStyle/>
+          <a:p>
+            <a:r>
+              <a:rPr lang="en-US" dirty="0" smtClean="0"/>
+              <a:t>Take action!</a:t>
+            </a:r>
+            <a:endParaRPr lang="uk-UA" dirty="0"/>
+          </a:p>
+        </p:txBody>
+      </p:sp>
+      <p:graphicFrame>
+        <p:nvGraphicFramePr>
+          <p:cNvPr id="7" name="Content Placeholder 6"/>
+          <p:cNvGraphicFramePr>
+            <a:graphicFrameLocks noGrp="1"/>
+          </p:cNvGraphicFramePr>
+          <p:nvPr>
+            <p:ph idx="1"/>
+            <p:extLst>
+              <p:ext uri="{D42A27DB-BD31-4B8C-83A1-F6EECF244321}">
+                <p14:modId xmlns:p14="http://schemas.microsoft.com/office/powerpoint/2010/main" val="2259626302"/>
+              </p:ext>
+            </p:extLst>
+          </p:nvPr>
+        </p:nvGraphicFramePr>
+        <p:xfrm>
+          <a:off x="677863" y="2160588"/>
+          <a:ext cx="8593137" cy="3881437"/>
+        </p:xfrm>
+        <a:graphic>
+          <a:graphicData uri="http://schemas.openxmlformats.org/drawingml/2006/diagram">
+            <dgm:relIds xmlns:dgm="http://schemas.openxmlformats.org/drawingml/2006/diagram" xmlns:r="http://schemas.openxmlformats.org/officeDocument/2006/relationships" r:dm="rId2" r:lo="rId3" r:qs="rId4" r:cs="rId5"/>
+          </a:graphicData>
+        </a:graphic>
+      </p:graphicFrame>
+    </p:spTree>
+    <p:extLst>
+      <p:ext uri="{BB962C8B-B14F-4D97-AF65-F5344CB8AC3E}">
+        <p14:creationId xmlns:p14="http://schemas.microsoft.com/office/powerpoint/2010/main" val="3746426954"/>
+      </p:ext>
+    </p:extLst>
+  </p:cSld>
+  <p:clrMapOvr>
+    <a:masterClrMapping/>
+  </p:clrMapOvr>
+  <mc:AlternateContent xmlns:mc="http://schemas.openxmlformats.org/markup-compatibility/2006" xmlns:p14="http://schemas.microsoft.com/office/powerpoint/2010/main">
+    <mc:Choice Requires="p14">
+      <p:transition spd="med" p14:dur="700">
+        <p:fade/>
+      </p:transition>
+    </mc:Choice>
+    <mc:Fallback xmlns="">
+      <p:transition spd="med">
+        <p:fade/>
+      </p:transition>
+    </mc:Fallback>
+  </mc:AlternateContent>
+  <p:timing>
+    <p:tnLst>
+      <p:par>
+        <p:cTn id="1" dur="indefinite" restart="never" nodeType="tmRoot">
+          <p:childTnLst>
+            <p:seq concurrent="1" nextAc="seek">
+              <p:cTn id="2" dur="indefinite" nodeType="mainSeq">
+                <p:childTnLst>
+                  <p:par>
+                    <p:cTn id="3" fill="hold">
+                      <p:stCondLst>
+                        <p:cond delay="indefinite"/>
+                      </p:stCondLst>
+                      <p:childTnLst>
+                        <p:par>
+                          <p:cTn id="4" fill="hold">
+                            <p:stCondLst>
+                              <p:cond delay="0"/>
+                            </p:stCondLst>
+                            <p:childTnLst>
+                              <p:par>
+                                <p:cTn id="5" presetID="10" presetClass="entr" presetSubtype="0" fill="hold" grpId="0" nodeType="clickEffect">
+                                  <p:stCondLst>
+                                    <p:cond delay="0"/>
+                                  </p:stCondLst>
+                                  <p:childTnLst>
+                                    <p:set>
+                                      <p:cBhvr>
+                                        <p:cTn id="6" dur="1" fill="hold">
+                                          <p:stCondLst>
+                                            <p:cond delay="0"/>
+                                          </p:stCondLst>
+                                        </p:cTn>
+                                        <p:tgtEl>
+                                          <p:spTgt spid="7">
+                                            <p:graphicEl>
+                                              <a:dgm id="{AEAEAF00-0AD7-419C-8781-0B47C6DC736B}"/>
+                                            </p:graphicEl>
+                                          </p:spTgt>
+                                        </p:tgtEl>
+                                        <p:attrNameLst>
+                                          <p:attrName>style.visibility</p:attrName>
+                                        </p:attrNameLst>
+                                      </p:cBhvr>
+                                      <p:to>
+                                        <p:strVal val="visible"/>
+                                      </p:to>
+                                    </p:set>
+                                    <p:animEffect transition="in" filter="fade">
+                                      <p:cBhvr>
+                                        <p:cTn id="7" dur="500"/>
+                                        <p:tgtEl>
+                                          <p:spTgt spid="7">
+                                            <p:graphicEl>
+                                              <a:dgm id="{AEAEAF00-0AD7-419C-8781-0B47C6DC736B}"/>
+                                            </p:graphicEl>
+                                          </p:spTgt>
+                                        </p:tgtEl>
+                                      </p:cBhvr>
+                                    </p:animEffect>
+                                  </p:childTnLst>
+                                </p:cTn>
+                              </p:par>
+                              <p:par>
+                                <p:cTn id="8" presetID="10" presetClass="entr" presetSubtype="0" fill="hold" grpId="0" nodeType="withEffect">
+                                  <p:stCondLst>
+                                    <p:cond delay="0"/>
+                                  </p:stCondLst>
+                                  <p:childTnLst>
+                                    <p:set>
+                                      <p:cBhvr>
+                                        <p:cTn id="9" dur="1" fill="hold">
+                                          <p:stCondLst>
+                                            <p:cond delay="0"/>
+                                          </p:stCondLst>
+                                        </p:cTn>
+                                        <p:tgtEl>
+                                          <p:spTgt spid="7">
+                                            <p:graphicEl>
+                                              <a:dgm id="{01301E56-5690-4A2D-9C44-E9534343AF9B}"/>
+                                            </p:graphicEl>
+                                          </p:spTgt>
+                                        </p:tgtEl>
+                                        <p:attrNameLst>
+                                          <p:attrName>style.visibility</p:attrName>
+                                        </p:attrNameLst>
+                                      </p:cBhvr>
+                                      <p:to>
+                                        <p:strVal val="visible"/>
+                                      </p:to>
+                                    </p:set>
+                                    <p:animEffect transition="in" filter="fade">
+                                      <p:cBhvr>
+                                        <p:cTn id="10" dur="500"/>
+                                        <p:tgtEl>
+                                          <p:spTgt spid="7">
+                                            <p:graphicEl>
+                                              <a:dgm id="{01301E56-5690-4A2D-9C44-E9534343AF9B}"/>
+                                            </p:graphicEl>
+                                          </p:spTgt>
+                                        </p:tgtEl>
+                                      </p:cBhvr>
+                                    </p:animEffect>
+                                  </p:childTnLst>
+                                </p:cTn>
+                              </p:par>
+                            </p:childTnLst>
+                          </p:cTn>
+                        </p:par>
+                        <p:par>
+                          <p:cTn id="11" fill="hold">
+                            <p:stCondLst>
+                              <p:cond delay="500"/>
+                            </p:stCondLst>
+                            <p:childTnLst>
+                              <p:par>
+                                <p:cTn id="12" presetID="10" presetClass="entr" presetSubtype="0" fill="hold" grpId="0" nodeType="afterEffect">
+                                  <p:stCondLst>
+                                    <p:cond delay="0"/>
+                                  </p:stCondLst>
+                                  <p:childTnLst>
+                                    <p:set>
+                                      <p:cBhvr>
+                                        <p:cTn id="13" dur="1" fill="hold">
+                                          <p:stCondLst>
+                                            <p:cond delay="0"/>
+                                          </p:stCondLst>
+                                        </p:cTn>
+                                        <p:tgtEl>
+                                          <p:spTgt spid="7">
+                                            <p:graphicEl>
+                                              <a:dgm id="{1F52055F-89CD-4B6F-A6AE-86A92732CF07}"/>
+                                            </p:graphicEl>
+                                          </p:spTgt>
+                                        </p:tgtEl>
+                                        <p:attrNameLst>
+                                          <p:attrName>style.visibility</p:attrName>
+                                        </p:attrNameLst>
+                                      </p:cBhvr>
+                                      <p:to>
+                                        <p:strVal val="visible"/>
+                                      </p:to>
+                                    </p:set>
+                                    <p:animEffect transition="in" filter="fade">
+                                      <p:cBhvr>
+                                        <p:cTn id="14" dur="500"/>
+                                        <p:tgtEl>
+                                          <p:spTgt spid="7">
+                                            <p:graphicEl>
+                                              <a:dgm id="{1F52055F-89CD-4B6F-A6AE-86A92732CF07}"/>
+                                            </p:graphicEl>
+                                          </p:spTgt>
+                                        </p:tgtEl>
+                                      </p:cBhvr>
+                                    </p:animEffect>
+                                  </p:childTnLst>
+                                </p:cTn>
+                              </p:par>
+                              <p:par>
+                                <p:cTn id="15" presetID="10" presetClass="entr" presetSubtype="0" fill="hold" grpId="0" nodeType="withEffect">
+                                  <p:stCondLst>
+                                    <p:cond delay="0"/>
+                                  </p:stCondLst>
+                                  <p:childTnLst>
+                                    <p:set>
+                                      <p:cBhvr>
+                                        <p:cTn id="16" dur="1" fill="hold">
+                                          <p:stCondLst>
+                                            <p:cond delay="0"/>
+                                          </p:stCondLst>
+                                        </p:cTn>
+                                        <p:tgtEl>
+                                          <p:spTgt spid="7">
+                                            <p:graphicEl>
+                                              <a:dgm id="{D7CFAD6C-8749-4E80-B986-1915077D2EBD}"/>
+                                            </p:graphicEl>
+                                          </p:spTgt>
+                                        </p:tgtEl>
+                                        <p:attrNameLst>
+                                          <p:attrName>style.visibility</p:attrName>
+                                        </p:attrNameLst>
+                                      </p:cBhvr>
+                                      <p:to>
+                                        <p:strVal val="visible"/>
+                                      </p:to>
+                                    </p:set>
+                                    <p:animEffect transition="in" filter="fade">
+                                      <p:cBhvr>
+                                        <p:cTn id="17" dur="500"/>
+                                        <p:tgtEl>
+                                          <p:spTgt spid="7">
+                                            <p:graphicEl>
+                                              <a:dgm id="{D7CFAD6C-8749-4E80-B986-1915077D2EBD}"/>
+                                            </p:graphicEl>
+                                          </p:spTgt>
+                                        </p:tgtEl>
+                                      </p:cBhvr>
+                                    </p:animEffect>
+                                  </p:childTnLst>
+                                </p:cTn>
+                              </p:par>
+                            </p:childTnLst>
+                          </p:cTn>
+                        </p:par>
+                        <p:par>
+                          <p:cTn id="18" fill="hold">
+                            <p:stCondLst>
+                              <p:cond delay="1000"/>
+                            </p:stCondLst>
+                            <p:childTnLst>
+                              <p:par>
+                                <p:cTn id="19" presetID="10" presetClass="entr" presetSubtype="0" fill="hold" grpId="0" nodeType="afterEffect">
+                                  <p:stCondLst>
+                                    <p:cond delay="0"/>
+                                  </p:stCondLst>
+                                  <p:childTnLst>
+                                    <p:set>
+                                      <p:cBhvr>
+                                        <p:cTn id="20" dur="1" fill="hold">
+                                          <p:stCondLst>
+                                            <p:cond delay="0"/>
+                                          </p:stCondLst>
+                                        </p:cTn>
+                                        <p:tgtEl>
+                                          <p:spTgt spid="7">
+                                            <p:graphicEl>
+                                              <a:dgm id="{6EA8D655-BF40-419C-8E09-B5383BCE1317}"/>
+                                            </p:graphicEl>
+                                          </p:spTgt>
+                                        </p:tgtEl>
+                                        <p:attrNameLst>
+                                          <p:attrName>style.visibility</p:attrName>
+                                        </p:attrNameLst>
+                                      </p:cBhvr>
+                                      <p:to>
+                                        <p:strVal val="visible"/>
+                                      </p:to>
+                                    </p:set>
+                                    <p:animEffect transition="in" filter="fade">
+                                      <p:cBhvr>
+                                        <p:cTn id="21" dur="500"/>
+                                        <p:tgtEl>
+                                          <p:spTgt spid="7">
+                                            <p:graphicEl>
+                                              <a:dgm id="{6EA8D655-BF40-419C-8E09-B5383BCE1317}"/>
+                                            </p:graphicEl>
+                                          </p:spTgt>
+                                        </p:tgtEl>
+                                      </p:cBhvr>
+                                    </p:animEffect>
+                                  </p:childTnLst>
+                                </p:cTn>
+                              </p:par>
+                              <p:par>
+                                <p:cTn id="22" presetID="10" presetClass="entr" presetSubtype="0" fill="hold" grpId="0" nodeType="withEffect">
+                                  <p:stCondLst>
+                                    <p:cond delay="0"/>
+                                  </p:stCondLst>
+                                  <p:childTnLst>
+                                    <p:set>
+                                      <p:cBhvr>
+                                        <p:cTn id="23" dur="1" fill="hold">
+                                          <p:stCondLst>
+                                            <p:cond delay="0"/>
+                                          </p:stCondLst>
+                                        </p:cTn>
+                                        <p:tgtEl>
+                                          <p:spTgt spid="7">
+                                            <p:graphicEl>
+                                              <a:dgm id="{50646914-29DA-46A5-827E-723E3B21A12D}"/>
+                                            </p:graphicEl>
+                                          </p:spTgt>
+                                        </p:tgtEl>
+                                        <p:attrNameLst>
+                                          <p:attrName>style.visibility</p:attrName>
+                                        </p:attrNameLst>
+                                      </p:cBhvr>
+                                      <p:to>
+                                        <p:strVal val="visible"/>
+                                      </p:to>
+                                    </p:set>
+                                    <p:animEffect transition="in" filter="fade">
+                                      <p:cBhvr>
+                                        <p:cTn id="24" dur="500"/>
+                                        <p:tgtEl>
+                                          <p:spTgt spid="7">
+                                            <p:graphicEl>
+                                              <a:dgm id="{50646914-29DA-46A5-827E-723E3B21A12D}"/>
+                                            </p:graphicEl>
+                                          </p:spTgt>
+                                        </p:tgtEl>
+                                      </p:cBhvr>
+                                    </p:animEffect>
+                                  </p:childTnLst>
+                                </p:cTn>
+                              </p:par>
+                            </p:childTnLst>
+                          </p:cTn>
+                        </p:par>
+                        <p:par>
+                          <p:cTn id="25" fill="hold">
+                            <p:stCondLst>
+                              <p:cond delay="1500"/>
+                            </p:stCondLst>
+                            <p:childTnLst>
+                              <p:par>
+                                <p:cTn id="26" presetID="10" presetClass="entr" presetSubtype="0" fill="hold" grpId="0" nodeType="afterEffect">
+                                  <p:stCondLst>
+                                    <p:cond delay="0"/>
+                                  </p:stCondLst>
+                                  <p:childTnLst>
+                                    <p:set>
+                                      <p:cBhvr>
+                                        <p:cTn id="27" dur="1" fill="hold">
+                                          <p:stCondLst>
+                                            <p:cond delay="0"/>
+                                          </p:stCondLst>
+                                        </p:cTn>
+                                        <p:tgtEl>
+                                          <p:spTgt spid="7">
+                                            <p:graphicEl>
+                                              <a:dgm id="{7211D0F6-1B30-40CD-B99A-7B6213DCDA69}"/>
+                                            </p:graphicEl>
+                                          </p:spTgt>
+                                        </p:tgtEl>
+                                        <p:attrNameLst>
+                                          <p:attrName>style.visibility</p:attrName>
+                                        </p:attrNameLst>
+                                      </p:cBhvr>
+                                      <p:to>
+                                        <p:strVal val="visible"/>
+                                      </p:to>
+                                    </p:set>
+                                    <p:animEffect transition="in" filter="fade">
+                                      <p:cBhvr>
+                                        <p:cTn id="28" dur="500"/>
+                                        <p:tgtEl>
+                                          <p:spTgt spid="7">
+                                            <p:graphicEl>
+                                              <a:dgm id="{7211D0F6-1B30-40CD-B99A-7B6213DCDA69}"/>
+                                            </p:graphicEl>
+                                          </p:spTgt>
+                                        </p:tgtEl>
+                                      </p:cBhvr>
+                                    </p:animEffect>
+                                  </p:childTnLst>
+                                </p:cTn>
+                              </p:par>
+                              <p:par>
+                                <p:cTn id="29" presetID="10" presetClass="entr" presetSubtype="0" fill="hold" grpId="0" nodeType="withEffect">
+                                  <p:stCondLst>
+                                    <p:cond delay="0"/>
+                                  </p:stCondLst>
+                                  <p:childTnLst>
+                                    <p:set>
+                                      <p:cBhvr>
+                                        <p:cTn id="30" dur="1" fill="hold">
+                                          <p:stCondLst>
+                                            <p:cond delay="0"/>
+                                          </p:stCondLst>
+                                        </p:cTn>
+                                        <p:tgtEl>
+                                          <p:spTgt spid="7">
+                                            <p:graphicEl>
+                                              <a:dgm id="{F88E43D2-2555-499E-AC97-7A10ACA478E7}"/>
+                                            </p:graphicEl>
+                                          </p:spTgt>
+                                        </p:tgtEl>
+                                        <p:attrNameLst>
+                                          <p:attrName>style.visibility</p:attrName>
+                                        </p:attrNameLst>
+                                      </p:cBhvr>
+                                      <p:to>
+                                        <p:strVal val="visible"/>
+                                      </p:to>
+                                    </p:set>
+                                    <p:animEffect transition="in" filter="fade">
+                                      <p:cBhvr>
+                                        <p:cTn id="31" dur="500"/>
+                                        <p:tgtEl>
+                                          <p:spTgt spid="7">
+                                            <p:graphicEl>
+                                              <a:dgm id="{F88E43D2-2555-499E-AC97-7A10ACA478E7}"/>
+                                            </p:graphicEl>
+                                          </p:spTgt>
+                                        </p:tgtEl>
+                                      </p:cBhvr>
+                                    </p:animEffect>
+                                  </p:childTnLst>
+                                </p:cTn>
+                              </p:par>
+                            </p:childTnLst>
+                          </p:cTn>
+                        </p:par>
+                      </p:childTnLst>
+                    </p:cTn>
+                  </p:par>
+                </p:childTnLst>
+              </p:cTn>
+              <p:prevCondLst>
+                <p:cond evt="onPrev" delay="0">
+                  <p:tgtEl>
+                    <p:sldTgt/>
+                  </p:tgtEl>
+                </p:cond>
+              </p:prevCondLst>
+              <p:nextCondLst>
+                <p:cond evt="onNext" delay="0">
+                  <p:tgtEl>
+                    <p:sldTgt/>
+                  </p:tgtEl>
+                </p:cond>
+              </p:nextCondLst>
+            </p:seq>
+          </p:childTnLst>
+        </p:cTn>
+      </p:par>
+    </p:tnLst>
+    <p:bldLst>
+      <p:bldGraphic spid="7" grpId="0" uiExpand="1">
+        <p:bldSub>
+          <a:bldDgm bld="one"/>
+        </p:bldSub>
+      </p:bldGraphic>
+    </p:bldLst>
   </p:timing>
 </p:sld>
 </file>

</xml_diff>